<commit_message>
Looks like many changes since last run
</commit_message>
<xml_diff>
--- a/Presentations/AOPNA_EPA.pptx
+++ b/Presentations/AOPNA_EPA.pptx
@@ -5,15 +5,21 @@
     <p:sldMasterId id="2147483648" r:id="rId1"/>
   </p:sldMasterIdLst>
   <p:notesMasterIdLst>
-    <p:notesMasterId r:id="rId5"/>
+    <p:notesMasterId r:id="rId11"/>
   </p:notesMasterIdLst>
   <p:handoutMasterIdLst>
-    <p:handoutMasterId r:id="rId6"/>
+    <p:handoutMasterId r:id="rId12"/>
   </p:handoutMasterIdLst>
   <p:sldIdLst>
     <p:sldId id="258" r:id="rId2"/>
     <p:sldId id="260" r:id="rId3"/>
-    <p:sldId id="271" r:id="rId4"/>
+    <p:sldId id="277" r:id="rId4"/>
+    <p:sldId id="276" r:id="rId5"/>
+    <p:sldId id="274" r:id="rId6"/>
+    <p:sldId id="275" r:id="rId7"/>
+    <p:sldId id="271" r:id="rId8"/>
+    <p:sldId id="273" r:id="rId9"/>
+    <p:sldId id="272" r:id="rId10"/>
   </p:sldIdLst>
   <p:sldSz cx="9144000" cy="6858000" type="screen4x3"/>
   <p:notesSz cx="6858000" cy="9144000"/>
@@ -1268,7 +1274,472 @@
     </p:spTree>
     <p:extLst>
       <p:ext uri="{BB962C8B-B14F-4D97-AF65-F5344CB8AC3E}">
+        <p14:creationId xmlns:p14="http://schemas.microsoft.com/office/powerpoint/2010/main" val="4033167106"/>
+      </p:ext>
+    </p:extLst>
+  </p:cSld>
+  <p:clrMapOvr>
+    <a:masterClrMapping/>
+  </p:clrMapOvr>
+</p:notes>
+</file>
+
+<file path=ppt/notesSlides/notesSlide4.xml><?xml version="1.0" encoding="utf-8"?>
+<p:notes xmlns:a="http://schemas.openxmlformats.org/drawingml/2006/main" xmlns:r="http://schemas.openxmlformats.org/officeDocument/2006/relationships" xmlns:p="http://schemas.openxmlformats.org/presentationml/2006/main">
+  <p:cSld>
+    <p:spTree>
+      <p:nvGrpSpPr>
+        <p:cNvPr id="1" name=""/>
+        <p:cNvGrpSpPr/>
+        <p:nvPr/>
+      </p:nvGrpSpPr>
+      <p:grpSpPr>
+        <a:xfrm>
+          <a:off x="0" y="0"/>
+          <a:ext cx="0" cy="0"/>
+          <a:chOff x="0" y="0"/>
+          <a:chExt cx="0" cy="0"/>
+        </a:xfrm>
+      </p:grpSpPr>
+      <p:sp>
+        <p:nvSpPr>
+          <p:cNvPr id="31746" name="Rectangle 7"/>
+          <p:cNvSpPr>
+            <a:spLocks noGrp="1" noChangeArrowheads="1"/>
+          </p:cNvSpPr>
+          <p:nvPr>
+            <p:ph type="sldNum" sz="quarter" idx="5"/>
+          </p:nvPr>
+        </p:nvSpPr>
+        <p:spPr>
+          <a:noFill/>
+        </p:spPr>
+        <p:txBody>
+          <a:bodyPr/>
+          <a:lstStyle/>
+          <a:p>
+            <a:fld id="{1BA582EA-DA63-4B44-B43D-B8559A932F30}" type="slidenum">
+              <a:rPr lang="en-US" smtClean="0"/>
+              <a:pPr/>
+              <a:t>3</a:t>
+            </a:fld>
+            <a:endParaRPr lang="en-US"/>
+          </a:p>
+        </p:txBody>
+      </p:sp>
+      <p:sp>
+        <p:nvSpPr>
+          <p:cNvPr id="31747" name="Rectangle 2"/>
+          <p:cNvSpPr>
+            <a:spLocks noGrp="1" noRot="1" noChangeAspect="1" noChangeArrowheads="1" noTextEdit="1"/>
+          </p:cNvSpPr>
+          <p:nvPr>
+            <p:ph type="sldImg"/>
+          </p:nvPr>
+        </p:nvSpPr>
+        <p:spPr>
+          <a:ln/>
+        </p:spPr>
+      </p:sp>
+      <p:sp>
+        <p:nvSpPr>
+          <p:cNvPr id="31748" name="Rectangle 3"/>
+          <p:cNvSpPr>
+            <a:spLocks noGrp="1" noChangeArrowheads="1"/>
+          </p:cNvSpPr>
+          <p:nvPr>
+            <p:ph type="body" idx="1"/>
+          </p:nvPr>
+        </p:nvSpPr>
+        <p:spPr>
+          <a:noFill/>
+          <a:ln/>
+        </p:spPr>
+        <p:txBody>
+          <a:bodyPr/>
+          <a:lstStyle/>
+          <a:p>
+            <a:pPr eaLnBrk="1" hangingPunct="1"/>
+            <a:endParaRPr lang="en-US"/>
+          </a:p>
+        </p:txBody>
+      </p:sp>
+    </p:spTree>
+    <p:extLst>
+      <p:ext uri="{BB962C8B-B14F-4D97-AF65-F5344CB8AC3E}">
+        <p14:creationId xmlns:p14="http://schemas.microsoft.com/office/powerpoint/2010/main" val="3574710570"/>
+      </p:ext>
+    </p:extLst>
+  </p:cSld>
+  <p:clrMapOvr>
+    <a:masterClrMapping/>
+  </p:clrMapOvr>
+</p:notes>
+</file>
+
+<file path=ppt/notesSlides/notesSlide5.xml><?xml version="1.0" encoding="utf-8"?>
+<p:notes xmlns:a="http://schemas.openxmlformats.org/drawingml/2006/main" xmlns:r="http://schemas.openxmlformats.org/officeDocument/2006/relationships" xmlns:p="http://schemas.openxmlformats.org/presentationml/2006/main">
+  <p:cSld>
+    <p:spTree>
+      <p:nvGrpSpPr>
+        <p:cNvPr id="1" name=""/>
+        <p:cNvGrpSpPr/>
+        <p:nvPr/>
+      </p:nvGrpSpPr>
+      <p:grpSpPr>
+        <a:xfrm>
+          <a:off x="0" y="0"/>
+          <a:ext cx="0" cy="0"/>
+          <a:chOff x="0" y="0"/>
+          <a:chExt cx="0" cy="0"/>
+        </a:xfrm>
+      </p:grpSpPr>
+      <p:sp>
+        <p:nvSpPr>
+          <p:cNvPr id="31746" name="Rectangle 7"/>
+          <p:cNvSpPr>
+            <a:spLocks noGrp="1" noChangeArrowheads="1"/>
+          </p:cNvSpPr>
+          <p:nvPr>
+            <p:ph type="sldNum" sz="quarter" idx="5"/>
+          </p:nvPr>
+        </p:nvSpPr>
+        <p:spPr>
+          <a:noFill/>
+        </p:spPr>
+        <p:txBody>
+          <a:bodyPr/>
+          <a:lstStyle/>
+          <a:p>
+            <a:fld id="{1BA582EA-DA63-4B44-B43D-B8559A932F30}" type="slidenum">
+              <a:rPr lang="en-US" smtClean="0"/>
+              <a:pPr/>
+              <a:t>4</a:t>
+            </a:fld>
+            <a:endParaRPr lang="en-US"/>
+          </a:p>
+        </p:txBody>
+      </p:sp>
+      <p:sp>
+        <p:nvSpPr>
+          <p:cNvPr id="31747" name="Rectangle 2"/>
+          <p:cNvSpPr>
+            <a:spLocks noGrp="1" noRot="1" noChangeAspect="1" noChangeArrowheads="1" noTextEdit="1"/>
+          </p:cNvSpPr>
+          <p:nvPr>
+            <p:ph type="sldImg"/>
+          </p:nvPr>
+        </p:nvSpPr>
+        <p:spPr>
+          <a:ln/>
+        </p:spPr>
+      </p:sp>
+      <p:sp>
+        <p:nvSpPr>
+          <p:cNvPr id="31748" name="Rectangle 3"/>
+          <p:cNvSpPr>
+            <a:spLocks noGrp="1" noChangeArrowheads="1"/>
+          </p:cNvSpPr>
+          <p:nvPr>
+            <p:ph type="body" idx="1"/>
+          </p:nvPr>
+        </p:nvSpPr>
+        <p:spPr>
+          <a:noFill/>
+          <a:ln/>
+        </p:spPr>
+        <p:txBody>
+          <a:bodyPr/>
+          <a:lstStyle/>
+          <a:p>
+            <a:pPr eaLnBrk="1" hangingPunct="1"/>
+            <a:endParaRPr lang="en-US"/>
+          </a:p>
+        </p:txBody>
+      </p:sp>
+    </p:spTree>
+    <p:extLst>
+      <p:ext uri="{BB962C8B-B14F-4D97-AF65-F5344CB8AC3E}">
+        <p14:creationId xmlns:p14="http://schemas.microsoft.com/office/powerpoint/2010/main" val="1893873201"/>
+      </p:ext>
+    </p:extLst>
+  </p:cSld>
+  <p:clrMapOvr>
+    <a:masterClrMapping/>
+  </p:clrMapOvr>
+</p:notes>
+</file>
+
+<file path=ppt/notesSlides/notesSlide6.xml><?xml version="1.0" encoding="utf-8"?>
+<p:notes xmlns:a="http://schemas.openxmlformats.org/drawingml/2006/main" xmlns:r="http://schemas.openxmlformats.org/officeDocument/2006/relationships" xmlns:p="http://schemas.openxmlformats.org/presentationml/2006/main">
+  <p:cSld>
+    <p:spTree>
+      <p:nvGrpSpPr>
+        <p:cNvPr id="1" name=""/>
+        <p:cNvGrpSpPr/>
+        <p:nvPr/>
+      </p:nvGrpSpPr>
+      <p:grpSpPr>
+        <a:xfrm>
+          <a:off x="0" y="0"/>
+          <a:ext cx="0" cy="0"/>
+          <a:chOff x="0" y="0"/>
+          <a:chExt cx="0" cy="0"/>
+        </a:xfrm>
+      </p:grpSpPr>
+      <p:sp>
+        <p:nvSpPr>
+          <p:cNvPr id="31746" name="Rectangle 7"/>
+          <p:cNvSpPr>
+            <a:spLocks noGrp="1" noChangeArrowheads="1"/>
+          </p:cNvSpPr>
+          <p:nvPr>
+            <p:ph type="sldNum" sz="quarter" idx="5"/>
+          </p:nvPr>
+        </p:nvSpPr>
+        <p:spPr>
+          <a:noFill/>
+        </p:spPr>
+        <p:txBody>
+          <a:bodyPr/>
+          <a:lstStyle/>
+          <a:p>
+            <a:fld id="{1BA582EA-DA63-4B44-B43D-B8559A932F30}" type="slidenum">
+              <a:rPr lang="en-US" smtClean="0"/>
+              <a:pPr/>
+              <a:t>5</a:t>
+            </a:fld>
+            <a:endParaRPr lang="en-US"/>
+          </a:p>
+        </p:txBody>
+      </p:sp>
+      <p:sp>
+        <p:nvSpPr>
+          <p:cNvPr id="31747" name="Rectangle 2"/>
+          <p:cNvSpPr>
+            <a:spLocks noGrp="1" noRot="1" noChangeAspect="1" noChangeArrowheads="1" noTextEdit="1"/>
+          </p:cNvSpPr>
+          <p:nvPr>
+            <p:ph type="sldImg"/>
+          </p:nvPr>
+        </p:nvSpPr>
+        <p:spPr>
+          <a:ln/>
+        </p:spPr>
+      </p:sp>
+      <p:sp>
+        <p:nvSpPr>
+          <p:cNvPr id="31748" name="Rectangle 3"/>
+          <p:cNvSpPr>
+            <a:spLocks noGrp="1" noChangeArrowheads="1"/>
+          </p:cNvSpPr>
+          <p:nvPr>
+            <p:ph type="body" idx="1"/>
+          </p:nvPr>
+        </p:nvSpPr>
+        <p:spPr>
+          <a:noFill/>
+          <a:ln/>
+        </p:spPr>
+        <p:txBody>
+          <a:bodyPr/>
+          <a:lstStyle/>
+          <a:p>
+            <a:pPr eaLnBrk="1" hangingPunct="1"/>
+            <a:endParaRPr lang="en-US"/>
+          </a:p>
+        </p:txBody>
+      </p:sp>
+    </p:spTree>
+    <p:extLst>
+      <p:ext uri="{BB962C8B-B14F-4D97-AF65-F5344CB8AC3E}">
+        <p14:creationId xmlns:p14="http://schemas.microsoft.com/office/powerpoint/2010/main" val="3065803361"/>
+      </p:ext>
+    </p:extLst>
+  </p:cSld>
+  <p:clrMapOvr>
+    <a:masterClrMapping/>
+  </p:clrMapOvr>
+</p:notes>
+</file>
+
+<file path=ppt/notesSlides/notesSlide7.xml><?xml version="1.0" encoding="utf-8"?>
+<p:notes xmlns:a="http://schemas.openxmlformats.org/drawingml/2006/main" xmlns:r="http://schemas.openxmlformats.org/officeDocument/2006/relationships" xmlns:p="http://schemas.openxmlformats.org/presentationml/2006/main">
+  <p:cSld>
+    <p:spTree>
+      <p:nvGrpSpPr>
+        <p:cNvPr id="1" name=""/>
+        <p:cNvGrpSpPr/>
+        <p:nvPr/>
+      </p:nvGrpSpPr>
+      <p:grpSpPr>
+        <a:xfrm>
+          <a:off x="0" y="0"/>
+          <a:ext cx="0" cy="0"/>
+          <a:chOff x="0" y="0"/>
+          <a:chExt cx="0" cy="0"/>
+        </a:xfrm>
+      </p:grpSpPr>
+      <p:sp>
+        <p:nvSpPr>
+          <p:cNvPr id="31746" name="Rectangle 7"/>
+          <p:cNvSpPr>
+            <a:spLocks noGrp="1" noChangeArrowheads="1"/>
+          </p:cNvSpPr>
+          <p:nvPr>
+            <p:ph type="sldNum" sz="quarter" idx="5"/>
+          </p:nvPr>
+        </p:nvSpPr>
+        <p:spPr>
+          <a:noFill/>
+        </p:spPr>
+        <p:txBody>
+          <a:bodyPr/>
+          <a:lstStyle/>
+          <a:p>
+            <a:fld id="{1BA582EA-DA63-4B44-B43D-B8559A932F30}" type="slidenum">
+              <a:rPr lang="en-US" smtClean="0"/>
+              <a:pPr/>
+              <a:t>6</a:t>
+            </a:fld>
+            <a:endParaRPr lang="en-US"/>
+          </a:p>
+        </p:txBody>
+      </p:sp>
+      <p:sp>
+        <p:nvSpPr>
+          <p:cNvPr id="31747" name="Rectangle 2"/>
+          <p:cNvSpPr>
+            <a:spLocks noGrp="1" noRot="1" noChangeAspect="1" noChangeArrowheads="1" noTextEdit="1"/>
+          </p:cNvSpPr>
+          <p:nvPr>
+            <p:ph type="sldImg"/>
+          </p:nvPr>
+        </p:nvSpPr>
+        <p:spPr>
+          <a:ln/>
+        </p:spPr>
+      </p:sp>
+      <p:sp>
+        <p:nvSpPr>
+          <p:cNvPr id="31748" name="Rectangle 3"/>
+          <p:cNvSpPr>
+            <a:spLocks noGrp="1" noChangeArrowheads="1"/>
+          </p:cNvSpPr>
+          <p:nvPr>
+            <p:ph type="body" idx="1"/>
+          </p:nvPr>
+        </p:nvSpPr>
+        <p:spPr>
+          <a:noFill/>
+          <a:ln/>
+        </p:spPr>
+        <p:txBody>
+          <a:bodyPr/>
+          <a:lstStyle/>
+          <a:p>
+            <a:pPr eaLnBrk="1" hangingPunct="1"/>
+            <a:endParaRPr lang="en-US"/>
+          </a:p>
+        </p:txBody>
+      </p:sp>
+    </p:spTree>
+    <p:extLst>
+      <p:ext uri="{BB962C8B-B14F-4D97-AF65-F5344CB8AC3E}">
         <p14:creationId xmlns:p14="http://schemas.microsoft.com/office/powerpoint/2010/main" val="2590405260"/>
+      </p:ext>
+    </p:extLst>
+  </p:cSld>
+  <p:clrMapOvr>
+    <a:masterClrMapping/>
+  </p:clrMapOvr>
+</p:notes>
+</file>
+
+<file path=ppt/notesSlides/notesSlide8.xml><?xml version="1.0" encoding="utf-8"?>
+<p:notes xmlns:a="http://schemas.openxmlformats.org/drawingml/2006/main" xmlns:r="http://schemas.openxmlformats.org/officeDocument/2006/relationships" xmlns:p="http://schemas.openxmlformats.org/presentationml/2006/main">
+  <p:cSld>
+    <p:spTree>
+      <p:nvGrpSpPr>
+        <p:cNvPr id="1" name=""/>
+        <p:cNvGrpSpPr/>
+        <p:nvPr/>
+      </p:nvGrpSpPr>
+      <p:grpSpPr>
+        <a:xfrm>
+          <a:off x="0" y="0"/>
+          <a:ext cx="0" cy="0"/>
+          <a:chOff x="0" y="0"/>
+          <a:chExt cx="0" cy="0"/>
+        </a:xfrm>
+      </p:grpSpPr>
+      <p:sp>
+        <p:nvSpPr>
+          <p:cNvPr id="31746" name="Rectangle 7"/>
+          <p:cNvSpPr>
+            <a:spLocks noGrp="1" noChangeArrowheads="1"/>
+          </p:cNvSpPr>
+          <p:nvPr>
+            <p:ph type="sldNum" sz="quarter" idx="5"/>
+          </p:nvPr>
+        </p:nvSpPr>
+        <p:spPr>
+          <a:noFill/>
+        </p:spPr>
+        <p:txBody>
+          <a:bodyPr/>
+          <a:lstStyle/>
+          <a:p>
+            <a:fld id="{1BA582EA-DA63-4B44-B43D-B8559A932F30}" type="slidenum">
+              <a:rPr lang="en-US" smtClean="0"/>
+              <a:pPr/>
+              <a:t>7</a:t>
+            </a:fld>
+            <a:endParaRPr lang="en-US"/>
+          </a:p>
+        </p:txBody>
+      </p:sp>
+      <p:sp>
+        <p:nvSpPr>
+          <p:cNvPr id="31747" name="Rectangle 2"/>
+          <p:cNvSpPr>
+            <a:spLocks noGrp="1" noRot="1" noChangeAspect="1" noChangeArrowheads="1" noTextEdit="1"/>
+          </p:cNvSpPr>
+          <p:nvPr>
+            <p:ph type="sldImg"/>
+          </p:nvPr>
+        </p:nvSpPr>
+        <p:spPr>
+          <a:ln/>
+        </p:spPr>
+      </p:sp>
+      <p:sp>
+        <p:nvSpPr>
+          <p:cNvPr id="31748" name="Rectangle 3"/>
+          <p:cNvSpPr>
+            <a:spLocks noGrp="1" noChangeArrowheads="1"/>
+          </p:cNvSpPr>
+          <p:nvPr>
+            <p:ph type="body" idx="1"/>
+          </p:nvPr>
+        </p:nvSpPr>
+        <p:spPr>
+          <a:noFill/>
+          <a:ln/>
+        </p:spPr>
+        <p:txBody>
+          <a:bodyPr/>
+          <a:lstStyle/>
+          <a:p>
+            <a:pPr eaLnBrk="1" hangingPunct="1"/>
+            <a:endParaRPr lang="en-US"/>
+          </a:p>
+        </p:txBody>
+      </p:sp>
+    </p:spTree>
+    <p:extLst>
+      <p:ext uri="{BB962C8B-B14F-4D97-AF65-F5344CB8AC3E}">
+        <p14:creationId xmlns:p14="http://schemas.microsoft.com/office/powerpoint/2010/main" val="1050230464"/>
       </p:ext>
     </p:extLst>
   </p:cSld>
@@ -2713,7 +3184,7 @@
                   <a:schemeClr val="bg1"/>
                 </a:solidFill>
               </a:rPr>
-              <a:t>Full Name of Lab, Center, Office, Division or Staff goes here. </a:t>
+              <a:t>National Health and Environment Effects Research Laboratory, Mid-Continent Ecology Division, Duluth, MN 55804 </a:t>
             </a:r>
           </a:p>
         </p:txBody>
@@ -2889,10 +3360,11 @@
             <a:pPr>
               <a:defRPr/>
             </a:pPr>
-            <a:r>
-              <a:rPr lang="en-US" dirty="0"/>
-              <a:t>Date</a:t>
-            </a:r>
+            <a:fld id="{1619876A-92AB-4DDB-A228-F372D3AF9195}" type="datetime4">
+              <a:rPr lang="en-US" smtClean="0"/>
+              <a:t>May 25, 2017</a:t>
+            </a:fld>
+            <a:endParaRPr lang="en-US" dirty="0"/>
           </a:p>
         </p:txBody>
       </p:sp>
@@ -2909,7 +3381,7 @@
         <p:spPr bwMode="auto">
           <a:xfrm>
             <a:off x="3049587" y="3016250"/>
-            <a:ext cx="5654675" cy="255588"/>
+            <a:ext cx="5713413" cy="255588"/>
           </a:xfrm>
           <a:extLst>
             <a:ext uri="{91240B29-F687-4F45-9708-019B960494DF}">
@@ -2935,90 +3407,87 @@
             <a:pPr eaLnBrk="1" hangingPunct="1"/>
             <a:r>
               <a:rPr lang="en-US" dirty="0"/>
-              <a:t>N.L. Pollesch, J. O’Brien, D.L. Villeneuve</a:t>
+              <a:t>N.L. Pollesch*, J. O’Brien, &amp; D.L. Villeneuve</a:t>
             </a:r>
           </a:p>
-          <a:p>
-            <a:pPr eaLnBrk="1" hangingPunct="1"/>
-            <a:endParaRPr lang="en-US" dirty="0"/>
-          </a:p>
-          <a:p>
-            <a:pPr eaLnBrk="1" hangingPunct="1"/>
-            <a:endParaRPr lang="en-US" dirty="0"/>
-          </a:p>
-        </p:txBody>
-      </p:sp>
-      <p:graphicFrame>
-        <p:nvGraphicFramePr>
-          <p:cNvPr id="1026" name="Object 2"/>
-          <p:cNvGraphicFramePr>
-            <a:graphicFrameLocks noChangeAspect="1"/>
-          </p:cNvGraphicFramePr>
-          <p:nvPr>
-            <p:extLst>
-              <p:ext uri="{D42A27DB-BD31-4B8C-83A1-F6EECF244321}">
-                <p14:modId xmlns:p14="http://schemas.microsoft.com/office/powerpoint/2010/main" val="3429205975"/>
-              </p:ext>
-            </p:extLst>
-          </p:nvPr>
-        </p:nvGraphicFramePr>
-        <p:xfrm>
-          <a:off x="2895600" y="3353860"/>
-          <a:ext cx="6326230" cy="2788706"/>
-        </p:xfrm>
-        <a:graphic>
-          <a:graphicData uri="http://schemas.openxmlformats.org/presentationml/2006/ole">
-            <mc:AlternateContent xmlns:mc="http://schemas.openxmlformats.org/markup-compatibility/2006">
-              <mc:Choice xmlns:v="urn:schemas-microsoft-com:vml" Requires="v">
-                <p:oleObj spid="_x0000_s1028" name="Image" r:id="rId4" imgW="7314286" imgH="3606349" progId="Photoshop.Image.10">
-                  <p:embed/>
-                </p:oleObj>
-              </mc:Choice>
-              <mc:Fallback>
-                <p:oleObj name="Image" r:id="rId4" imgW="7314286" imgH="3606349" progId="Photoshop.Image.10">
-                  <p:embed/>
-                  <p:pic>
-                    <p:nvPicPr>
-                      <p:cNvPr id="0" name="Picture 2"/>
-                      <p:cNvPicPr>
-                        <a:picLocks noChangeAspect="1" noChangeArrowheads="1"/>
-                      </p:cNvPicPr>
-                      <p:nvPr/>
-                    </p:nvPicPr>
-                    <p:blipFill>
-                      <a:blip r:embed="rId5">
-                        <a:extLst>
-                          <a:ext uri="{28A0092B-C50C-407E-A947-70E740481C1C}">
-                            <a14:useLocalDpi xmlns:a14="http://schemas.microsoft.com/office/drawing/2010/main" val="0"/>
-                          </a:ext>
-                        </a:extLst>
-                      </a:blip>
-                      <a:srcRect b="10789"/>
-                      <a:stretch>
-                        <a:fillRect/>
-                      </a:stretch>
-                    </p:blipFill>
-                    <p:spPr bwMode="auto">
-                      <a:xfrm>
-                        <a:off x="2895600" y="3353860"/>
-                        <a:ext cx="6326230" cy="2788706"/>
-                      </a:xfrm>
-                      <a:prstGeom prst="rect">
-                        <a:avLst/>
-                      </a:prstGeom>
-                      <a:noFill/>
-                      <a:ln>
-                        <a:noFill/>
-                      </a:ln>
-                      <a:effectLst/>
-                    </p:spPr>
-                  </p:pic>
-                </p:oleObj>
-              </mc:Fallback>
-            </mc:AlternateContent>
-          </a:graphicData>
-        </a:graphic>
-      </p:graphicFrame>
+        </p:txBody>
+      </p:sp>
+      <p:sp>
+        <p:nvSpPr>
+          <p:cNvPr id="2" name="TextBox 1"/>
+          <p:cNvSpPr txBox="1"/>
+          <p:nvPr/>
+        </p:nvSpPr>
+        <p:spPr>
+          <a:xfrm>
+            <a:off x="5562601" y="4375428"/>
+            <a:ext cx="3047999" cy="1200329"/>
+          </a:xfrm>
+          <a:prstGeom prst="rect">
+            <a:avLst/>
+          </a:prstGeom>
+          <a:noFill/>
+        </p:spPr>
+        <p:txBody>
+          <a:bodyPr wrap="square" rtlCol="0">
+            <a:spAutoFit/>
+          </a:bodyPr>
+          <a:lstStyle/>
+          <a:p>
+            <a:pPr algn="r"/>
+            <a:r>
+              <a:rPr lang="en-US" sz="1600" dirty="0">
+                <a:solidFill>
+                  <a:schemeClr val="bg1"/>
+                </a:solidFill>
+                <a:latin typeface="Arial Narrow" panose="020B0606020202030204" pitchFamily="34" charset="0"/>
+              </a:rPr>
+              <a:t>*Contact Information:</a:t>
+            </a:r>
+          </a:p>
+          <a:p>
+            <a:pPr algn="r"/>
+            <a:r>
+              <a:rPr lang="en-US" sz="1400" i="1" dirty="0">
+                <a:solidFill>
+                  <a:schemeClr val="bg1"/>
+                </a:solidFill>
+                <a:latin typeface="Arial Narrow" panose="020B0606020202030204" pitchFamily="34" charset="0"/>
+              </a:rPr>
+              <a:t>Nate Pollesch, PhD</a:t>
+            </a:r>
+          </a:p>
+          <a:p>
+            <a:pPr algn="r"/>
+            <a:r>
+              <a:rPr lang="en-US" sz="1400" i="1" dirty="0">
+                <a:solidFill>
+                  <a:schemeClr val="bg1"/>
+                </a:solidFill>
+                <a:latin typeface="Arial Narrow" panose="020B0606020202030204" pitchFamily="34" charset="0"/>
+              </a:rPr>
+              <a:t>Pollesch.Nathan@epa.gov </a:t>
+            </a:r>
+            <a:br>
+              <a:rPr lang="en-US" sz="1400" i="1" dirty="0">
+                <a:solidFill>
+                  <a:schemeClr val="bg1"/>
+                </a:solidFill>
+                <a:latin typeface="Arial Narrow" panose="020B0606020202030204" pitchFamily="34" charset="0"/>
+              </a:rPr>
+            </a:br>
+            <a:r>
+              <a:rPr lang="en-US" sz="1400" i="1" dirty="0">
+                <a:solidFill>
+                  <a:schemeClr val="bg1"/>
+                </a:solidFill>
+                <a:latin typeface="Arial Narrow" panose="020B0606020202030204" pitchFamily="34" charset="0"/>
+              </a:rPr>
+              <a:t>US EPA Mid-Continent Ecology Division, Duluth, MN, USA</a:t>
+            </a:r>
+          </a:p>
+        </p:txBody>
+      </p:sp>
     </p:spTree>
   </p:cSld>
   <p:clrMapOvr>
@@ -3240,7 +3709,7 @@
           </p:cNvPicPr>
           <p:nvPr/>
         </p:nvPicPr>
-        <p:blipFill>
+        <p:blipFill rotWithShape="1">
           <a:blip r:embed="rId3">
             <a:extLst>
               <a:ext uri="{28A0092B-C50C-407E-A947-70E740481C1C}">
@@ -3248,182 +3717,70 @@
               </a:ext>
             </a:extLst>
           </a:blip>
-          <a:stretch>
-            <a:fillRect/>
-          </a:stretch>
+          <a:srcRect l="57273" t="20621" b="31166"/>
+          <a:stretch/>
         </p:blipFill>
         <p:spPr>
           <a:xfrm>
-            <a:off x="3762086" y="825500"/>
-            <a:ext cx="5381914" cy="5207000"/>
+            <a:off x="0" y="771524"/>
+            <a:ext cx="4888779" cy="5337176"/>
           </a:xfrm>
           <a:prstGeom prst="rect">
             <a:avLst/>
           </a:prstGeom>
         </p:spPr>
       </p:pic>
-    </p:spTree>
-  </p:cSld>
-  <p:clrMapOvr>
-    <a:masterClrMapping/>
-  </p:clrMapOvr>
-</p:sld>
-</file>
-
-<file path=ppt/slides/slide3.xml><?xml version="1.0" encoding="utf-8"?>
-<p:sld xmlns:a="http://schemas.openxmlformats.org/drawingml/2006/main" xmlns:r="http://schemas.openxmlformats.org/officeDocument/2006/relationships" xmlns:p="http://schemas.openxmlformats.org/presentationml/2006/main">
-  <p:cSld>
-    <p:spTree>
-      <p:nvGrpSpPr>
-        <p:cNvPr id="1" name=""/>
-        <p:cNvGrpSpPr/>
-        <p:nvPr/>
-      </p:nvGrpSpPr>
-      <p:grpSpPr>
-        <a:xfrm>
-          <a:off x="0" y="0"/>
-          <a:ext cx="0" cy="0"/>
-          <a:chOff x="0" y="0"/>
-          <a:chExt cx="0" cy="0"/>
-        </a:xfrm>
-      </p:grpSpPr>
-      <p:sp>
-        <p:nvSpPr>
-          <p:cNvPr id="18434" name="Rectangle 2"/>
-          <p:cNvSpPr>
-            <a:spLocks noGrp="1" noChangeArrowheads="1"/>
-          </p:cNvSpPr>
-          <p:nvPr>
-            <p:ph type="title"/>
-          </p:nvPr>
+      <p:sp>
+        <p:nvSpPr>
+          <p:cNvPr id="4" name="Rectangle 3"/>
+          <p:cNvSpPr/>
+          <p:nvPr/>
         </p:nvSpPr>
         <p:spPr>
           <a:xfrm>
-            <a:off x="685800" y="1957388"/>
-            <a:ext cx="7772400" cy="579437"/>
+            <a:off x="1621559" y="170160"/>
+            <a:ext cx="5900882" cy="461665"/>
           </a:xfrm>
-        </p:spPr>
-        <p:txBody>
-          <a:bodyPr anchor="t"/>
+          <a:prstGeom prst="rect">
+            <a:avLst/>
+          </a:prstGeom>
+        </p:spPr>
+        <p:txBody>
+          <a:bodyPr wrap="square">
+            <a:spAutoFit/>
+          </a:bodyPr>
           <a:lstStyle/>
           <a:p>
-            <a:pPr eaLnBrk="1" hangingPunct="1"/>
-            <a:endParaRPr lang="en-US" dirty="0"/>
-          </a:p>
-        </p:txBody>
-      </p:sp>
-      <p:sp>
-        <p:nvSpPr>
-          <p:cNvPr id="18435" name="Rectangle 3"/>
-          <p:cNvSpPr>
-            <a:spLocks noGrp="1" noChangeArrowheads="1"/>
-          </p:cNvSpPr>
-          <p:nvPr>
-            <p:ph type="body" idx="1"/>
-          </p:nvPr>
-        </p:nvSpPr>
-        <p:spPr/>
-        <p:txBody>
-          <a:bodyPr/>
-          <a:lstStyle/>
-          <a:p>
-            <a:pPr eaLnBrk="1" hangingPunct="1"/>
-            <a:endParaRPr lang="en-US"/>
-          </a:p>
-        </p:txBody>
-      </p:sp>
-      <p:sp>
-        <p:nvSpPr>
-          <p:cNvPr id="18436" name="Date Placeholder 7"/>
-          <p:cNvSpPr>
-            <a:spLocks noGrp="1"/>
-          </p:cNvSpPr>
-          <p:nvPr>
-            <p:ph type="dt" sz="quarter" idx="10"/>
-          </p:nvPr>
-        </p:nvSpPr>
-        <p:spPr>
-          <a:noFill/>
-        </p:spPr>
-        <p:txBody>
-          <a:bodyPr/>
-          <a:lstStyle/>
-          <a:p>
-            <a:fld id="{75FB81E4-ADE5-4B0D-9013-84BBB8D96257}" type="datetime1">
-              <a:rPr lang="en-US" smtClean="0"/>
-              <a:pPr/>
-              <a:t>5/25/2017</a:t>
-            </a:fld>
-            <a:endParaRPr lang="en-US"/>
-          </a:p>
-        </p:txBody>
-      </p:sp>
-      <p:sp>
-        <p:nvSpPr>
-          <p:cNvPr id="18437" name="Slide Number Placeholder 8"/>
-          <p:cNvSpPr>
-            <a:spLocks noGrp="1"/>
-          </p:cNvSpPr>
-          <p:nvPr>
-            <p:ph type="sldNum" sz="quarter" idx="12"/>
-          </p:nvPr>
-        </p:nvSpPr>
-        <p:spPr>
-          <a:noFill/>
-        </p:spPr>
-        <p:txBody>
-          <a:bodyPr/>
-          <a:lstStyle/>
-          <a:p>
-            <a:fld id="{CE64B86D-6B5D-43D5-BC3D-D0392806BE7A}" type="slidenum">
-              <a:rPr lang="en-US" smtClean="0"/>
-              <a:pPr/>
-              <a:t>2</a:t>
-            </a:fld>
-            <a:endParaRPr lang="en-US"/>
-          </a:p>
-        </p:txBody>
-      </p:sp>
-      <p:sp>
-        <p:nvSpPr>
-          <p:cNvPr id="18438" name="Footer Placeholder 9"/>
-          <p:cNvSpPr>
-            <a:spLocks noGrp="1"/>
-          </p:cNvSpPr>
-          <p:nvPr>
-            <p:ph type="ftr" sz="quarter" idx="11"/>
-          </p:nvPr>
-        </p:nvSpPr>
-        <p:spPr>
-          <a:noFill/>
-        </p:spPr>
-        <p:txBody>
-          <a:bodyPr/>
-          <a:lstStyle/>
-          <a:p>
+            <a:pPr algn="ctr"/>
             <a:r>
-              <a:rPr lang="en-US"/>
-              <a:t>U.S. Environmental Protection Agency</a:t>
+              <a:rPr lang="en-US" dirty="0">
+                <a:solidFill>
+                  <a:srgbClr val="026CB6"/>
+                </a:solidFill>
+              </a:rPr>
+              <a:t>The Complete AOPwiki Network</a:t>
             </a:r>
           </a:p>
         </p:txBody>
       </p:sp>
       <p:sp>
         <p:nvSpPr>
-          <p:cNvPr id="2" name="Rectangle 1"/>
+          <p:cNvPr id="3" name="Rectangle 2"/>
           <p:cNvSpPr/>
           <p:nvPr/>
         </p:nvSpPr>
         <p:spPr bwMode="auto">
           <a:xfrm>
             <a:off x="0" y="762000"/>
-            <a:ext cx="9144000" cy="5334000"/>
+            <a:ext cx="4876800" cy="5334000"/>
           </a:xfrm>
           <a:prstGeom prst="rect">
             <a:avLst/>
           </a:prstGeom>
           <a:solidFill>
-            <a:schemeClr val="tx1"/>
+            <a:schemeClr val="tx1">
+              <a:alpha val="78000"/>
+            </a:schemeClr>
           </a:solidFill>
           <a:ln w="9525" cap="flat" cmpd="sng" algn="ctr">
             <a:solidFill>
@@ -3475,6 +3832,1187 @@
           </a:p>
         </p:txBody>
       </p:sp>
+    </p:spTree>
+  </p:cSld>
+  <p:clrMapOvr>
+    <a:masterClrMapping/>
+  </p:clrMapOvr>
+</p:sld>
+</file>
+
+<file path=ppt/slides/slide3.xml><?xml version="1.0" encoding="utf-8"?>
+<p:sld xmlns:a="http://schemas.openxmlformats.org/drawingml/2006/main" xmlns:r="http://schemas.openxmlformats.org/officeDocument/2006/relationships" xmlns:p="http://schemas.openxmlformats.org/presentationml/2006/main">
+  <p:cSld>
+    <p:spTree>
+      <p:nvGrpSpPr>
+        <p:cNvPr id="1" name=""/>
+        <p:cNvGrpSpPr/>
+        <p:nvPr/>
+      </p:nvGrpSpPr>
+      <p:grpSpPr>
+        <a:xfrm>
+          <a:off x="0" y="0"/>
+          <a:ext cx="0" cy="0"/>
+          <a:chOff x="0" y="0"/>
+          <a:chExt cx="0" cy="0"/>
+        </a:xfrm>
+      </p:grpSpPr>
+      <p:sp>
+        <p:nvSpPr>
+          <p:cNvPr id="18434" name="Rectangle 2"/>
+          <p:cNvSpPr>
+            <a:spLocks noGrp="1" noChangeArrowheads="1"/>
+          </p:cNvSpPr>
+          <p:nvPr>
+            <p:ph type="title"/>
+          </p:nvPr>
+        </p:nvSpPr>
+        <p:spPr>
+          <a:xfrm>
+            <a:off x="685800" y="1957388"/>
+            <a:ext cx="7772400" cy="579437"/>
+          </a:xfrm>
+        </p:spPr>
+        <p:txBody>
+          <a:bodyPr anchor="t"/>
+          <a:lstStyle/>
+          <a:p>
+            <a:pPr eaLnBrk="1" hangingPunct="1"/>
+            <a:endParaRPr lang="en-US" dirty="0"/>
+          </a:p>
+        </p:txBody>
+      </p:sp>
+      <p:sp>
+        <p:nvSpPr>
+          <p:cNvPr id="18435" name="Rectangle 3"/>
+          <p:cNvSpPr>
+            <a:spLocks noGrp="1" noChangeArrowheads="1"/>
+          </p:cNvSpPr>
+          <p:nvPr>
+            <p:ph type="body" idx="1"/>
+          </p:nvPr>
+        </p:nvSpPr>
+        <p:spPr/>
+        <p:txBody>
+          <a:bodyPr/>
+          <a:lstStyle/>
+          <a:p>
+            <a:pPr eaLnBrk="1" hangingPunct="1"/>
+            <a:endParaRPr lang="en-US"/>
+          </a:p>
+        </p:txBody>
+      </p:sp>
+      <p:sp>
+        <p:nvSpPr>
+          <p:cNvPr id="18436" name="Date Placeholder 7"/>
+          <p:cNvSpPr>
+            <a:spLocks noGrp="1"/>
+          </p:cNvSpPr>
+          <p:nvPr>
+            <p:ph type="dt" sz="quarter" idx="10"/>
+          </p:nvPr>
+        </p:nvSpPr>
+        <p:spPr>
+          <a:noFill/>
+        </p:spPr>
+        <p:txBody>
+          <a:bodyPr/>
+          <a:lstStyle/>
+          <a:p>
+            <a:fld id="{75FB81E4-ADE5-4B0D-9013-84BBB8D96257}" type="datetime1">
+              <a:rPr lang="en-US" smtClean="0"/>
+              <a:pPr/>
+              <a:t>5/25/2017</a:t>
+            </a:fld>
+            <a:endParaRPr lang="en-US"/>
+          </a:p>
+        </p:txBody>
+      </p:sp>
+      <p:sp>
+        <p:nvSpPr>
+          <p:cNvPr id="18437" name="Slide Number Placeholder 8"/>
+          <p:cNvSpPr>
+            <a:spLocks noGrp="1"/>
+          </p:cNvSpPr>
+          <p:nvPr>
+            <p:ph type="sldNum" sz="quarter" idx="12"/>
+          </p:nvPr>
+        </p:nvSpPr>
+        <p:spPr>
+          <a:noFill/>
+        </p:spPr>
+        <p:txBody>
+          <a:bodyPr/>
+          <a:lstStyle/>
+          <a:p>
+            <a:fld id="{CE64B86D-6B5D-43D5-BC3D-D0392806BE7A}" type="slidenum">
+              <a:rPr lang="en-US" smtClean="0"/>
+              <a:pPr/>
+              <a:t>2</a:t>
+            </a:fld>
+            <a:endParaRPr lang="en-US"/>
+          </a:p>
+        </p:txBody>
+      </p:sp>
+      <p:sp>
+        <p:nvSpPr>
+          <p:cNvPr id="18438" name="Footer Placeholder 9"/>
+          <p:cNvSpPr>
+            <a:spLocks noGrp="1"/>
+          </p:cNvSpPr>
+          <p:nvPr>
+            <p:ph type="ftr" sz="quarter" idx="11"/>
+          </p:nvPr>
+        </p:nvSpPr>
+        <p:spPr>
+          <a:noFill/>
+        </p:spPr>
+        <p:txBody>
+          <a:bodyPr/>
+          <a:lstStyle/>
+          <a:p>
+            <a:r>
+              <a:rPr lang="en-US"/>
+              <a:t>U.S. Environmental Protection Agency</a:t>
+            </a:r>
+          </a:p>
+        </p:txBody>
+      </p:sp>
+      <p:sp>
+        <p:nvSpPr>
+          <p:cNvPr id="2" name="Rectangle 1"/>
+          <p:cNvSpPr/>
+          <p:nvPr/>
+        </p:nvSpPr>
+        <p:spPr bwMode="auto">
+          <a:xfrm>
+            <a:off x="0" y="762000"/>
+            <a:ext cx="9144000" cy="5334000"/>
+          </a:xfrm>
+          <a:prstGeom prst="rect">
+            <a:avLst/>
+          </a:prstGeom>
+          <a:solidFill>
+            <a:schemeClr val="tx1"/>
+          </a:solidFill>
+          <a:ln w="9525" cap="flat" cmpd="sng" algn="ctr">
+            <a:solidFill>
+              <a:schemeClr val="tx1"/>
+            </a:solidFill>
+            <a:prstDash val="solid"/>
+            <a:round/>
+            <a:headEnd type="none" w="med" len="med"/>
+            <a:tailEnd type="none" w="med" len="med"/>
+          </a:ln>
+          <a:effectLst/>
+          <a:extLst/>
+        </p:spPr>
+        <p:txBody>
+          <a:bodyPr vert="horz" wrap="square" lIns="91440" tIns="45720" rIns="91440" bIns="45720" numCol="1" rtlCol="0" anchor="t" anchorCtr="0" compatLnSpc="1">
+            <a:prstTxWarp prst="textNoShape">
+              <a:avLst/>
+            </a:prstTxWarp>
+          </a:bodyPr>
+          <a:lstStyle/>
+          <a:p>
+            <a:pPr marL="0" marR="0" indent="0" algn="l" defTabSz="914400" rtl="0" eaLnBrk="0" fontAlgn="base" latinLnBrk="0" hangingPunct="0">
+              <a:lnSpc>
+                <a:spcPct val="100000"/>
+              </a:lnSpc>
+              <a:spcBef>
+                <a:spcPct val="0"/>
+              </a:spcBef>
+              <a:spcAft>
+                <a:spcPct val="0"/>
+              </a:spcAft>
+              <a:buClrTx/>
+              <a:buSzTx/>
+              <a:buFontTx/>
+              <a:buNone/>
+              <a:tabLst/>
+            </a:pPr>
+            <a:endParaRPr kumimoji="0" lang="en-US" sz="2400" b="0" i="0" u="none" strike="noStrike" cap="none" normalizeH="0" baseline="0">
+              <a:ln>
+                <a:noFill/>
+              </a:ln>
+              <a:solidFill>
+                <a:schemeClr val="tx1"/>
+              </a:solidFill>
+              <a:effectLst/>
+              <a:latin typeface="Arial" charset="0"/>
+              <a:ea typeface="ＭＳ Ｐゴシック" pitchFamily="1" charset="-128"/>
+            </a:endParaRPr>
+          </a:p>
+        </p:txBody>
+      </p:sp>
+      <p:pic>
+        <p:nvPicPr>
+          <p:cNvPr id="8" name="Content Placeholder 3" descr="Screen Clipping"/>
+          <p:cNvPicPr>
+            <a:picLocks noChangeAspect="1"/>
+          </p:cNvPicPr>
+          <p:nvPr/>
+        </p:nvPicPr>
+        <p:blipFill rotWithShape="1">
+          <a:blip r:embed="rId3">
+            <a:extLst>
+              <a:ext uri="{28A0092B-C50C-407E-A947-70E740481C1C}">
+                <a14:useLocalDpi xmlns:a14="http://schemas.microsoft.com/office/drawing/2010/main" val="0"/>
+              </a:ext>
+            </a:extLst>
+          </a:blip>
+          <a:srcRect l="57273" t="20621" b="31166"/>
+          <a:stretch/>
+        </p:blipFill>
+        <p:spPr>
+          <a:xfrm>
+            <a:off x="0" y="771524"/>
+            <a:ext cx="4888779" cy="5337176"/>
+          </a:xfrm>
+          <a:prstGeom prst="rect">
+            <a:avLst/>
+          </a:prstGeom>
+        </p:spPr>
+      </p:pic>
+      <p:sp>
+        <p:nvSpPr>
+          <p:cNvPr id="4" name="Rectangle 3"/>
+          <p:cNvSpPr/>
+          <p:nvPr/>
+        </p:nvSpPr>
+        <p:spPr>
+          <a:xfrm>
+            <a:off x="1621559" y="170160"/>
+            <a:ext cx="5900882" cy="461665"/>
+          </a:xfrm>
+          <a:prstGeom prst="rect">
+            <a:avLst/>
+          </a:prstGeom>
+        </p:spPr>
+        <p:txBody>
+          <a:bodyPr wrap="square">
+            <a:spAutoFit/>
+          </a:bodyPr>
+          <a:lstStyle/>
+          <a:p>
+            <a:pPr algn="ctr"/>
+            <a:r>
+              <a:rPr lang="en-US" dirty="0">
+                <a:solidFill>
+                  <a:srgbClr val="026CB6"/>
+                </a:solidFill>
+              </a:rPr>
+              <a:t>The Complete AOPwiki Network</a:t>
+            </a:r>
+          </a:p>
+        </p:txBody>
+      </p:sp>
+      <p:sp>
+        <p:nvSpPr>
+          <p:cNvPr id="3" name="Rectangle 2"/>
+          <p:cNvSpPr/>
+          <p:nvPr/>
+        </p:nvSpPr>
+        <p:spPr bwMode="auto">
+          <a:xfrm>
+            <a:off x="0" y="762000"/>
+            <a:ext cx="4876800" cy="5334000"/>
+          </a:xfrm>
+          <a:prstGeom prst="rect">
+            <a:avLst/>
+          </a:prstGeom>
+          <a:solidFill>
+            <a:schemeClr val="tx1">
+              <a:alpha val="78000"/>
+            </a:schemeClr>
+          </a:solidFill>
+          <a:ln w="9525" cap="flat" cmpd="sng" algn="ctr">
+            <a:solidFill>
+              <a:schemeClr val="tx1"/>
+            </a:solidFill>
+            <a:prstDash val="solid"/>
+            <a:round/>
+            <a:headEnd type="none" w="med" len="med"/>
+            <a:tailEnd type="none" w="med" len="med"/>
+          </a:ln>
+          <a:effectLst/>
+          <a:extLst/>
+        </p:spPr>
+        <p:txBody>
+          <a:bodyPr vert="horz" wrap="square" lIns="91440" tIns="45720" rIns="91440" bIns="45720" numCol="1" rtlCol="0" anchor="t" anchorCtr="0" compatLnSpc="1">
+            <a:prstTxWarp prst="textNoShape">
+              <a:avLst/>
+            </a:prstTxWarp>
+          </a:bodyPr>
+          <a:lstStyle/>
+          <a:p>
+            <a:pPr marL="0" marR="0" indent="0" algn="l" defTabSz="914400" rtl="0" eaLnBrk="0" fontAlgn="base" latinLnBrk="0" hangingPunct="0">
+              <a:lnSpc>
+                <a:spcPct val="100000"/>
+              </a:lnSpc>
+              <a:spcBef>
+                <a:spcPct val="0"/>
+              </a:spcBef>
+              <a:spcAft>
+                <a:spcPct val="0"/>
+              </a:spcAft>
+              <a:buClrTx/>
+              <a:buSzTx/>
+              <a:buFontTx/>
+              <a:buNone/>
+              <a:tabLst/>
+            </a:pPr>
+            <a:endParaRPr kumimoji="0" lang="en-US" sz="2400" b="0" i="0" u="none" strike="noStrike" cap="none" normalizeH="0" baseline="0">
+              <a:ln>
+                <a:noFill/>
+              </a:ln>
+              <a:solidFill>
+                <a:schemeClr val="tx1"/>
+              </a:solidFill>
+              <a:effectLst/>
+              <a:latin typeface="Arial" charset="0"/>
+              <a:ea typeface="ＭＳ Ｐゴシック" pitchFamily="1" charset="-128"/>
+            </a:endParaRPr>
+          </a:p>
+        </p:txBody>
+      </p:sp>
+      <p:pic>
+        <p:nvPicPr>
+          <p:cNvPr id="11" name="Picture 10"/>
+          <p:cNvPicPr>
+            <a:picLocks noChangeAspect="1"/>
+          </p:cNvPicPr>
+          <p:nvPr/>
+        </p:nvPicPr>
+        <p:blipFill>
+          <a:blip r:embed="rId4"/>
+          <a:stretch>
+            <a:fillRect/>
+          </a:stretch>
+        </p:blipFill>
+        <p:spPr>
+          <a:xfrm>
+            <a:off x="5488209" y="2106813"/>
+            <a:ext cx="2560108" cy="2304097"/>
+          </a:xfrm>
+          <a:prstGeom prst="rect">
+            <a:avLst/>
+          </a:prstGeom>
+        </p:spPr>
+      </p:pic>
+      <p:sp>
+        <p:nvSpPr>
+          <p:cNvPr id="12" name="TextBox 11"/>
+          <p:cNvSpPr txBox="1"/>
+          <p:nvPr/>
+        </p:nvSpPr>
+        <p:spPr>
+          <a:xfrm>
+            <a:off x="5165362" y="1957388"/>
+            <a:ext cx="1246909" cy="369332"/>
+          </a:xfrm>
+          <a:prstGeom prst="rect">
+            <a:avLst/>
+          </a:prstGeom>
+          <a:noFill/>
+        </p:spPr>
+        <p:txBody>
+          <a:bodyPr wrap="square" rtlCol="0">
+            <a:spAutoFit/>
+          </a:bodyPr>
+          <a:lstStyle/>
+          <a:p>
+            <a:r>
+              <a:rPr lang="en-US" dirty="0">
+                <a:solidFill>
+                  <a:schemeClr val="bg1"/>
+                </a:solidFill>
+              </a:rPr>
+              <a:t>Node</a:t>
+            </a:r>
+          </a:p>
+        </p:txBody>
+      </p:sp>
+      <p:sp>
+        <p:nvSpPr>
+          <p:cNvPr id="13" name="TextBox 12"/>
+          <p:cNvSpPr txBox="1"/>
+          <p:nvPr/>
+        </p:nvSpPr>
+        <p:spPr>
+          <a:xfrm>
+            <a:off x="7657201" y="4041578"/>
+            <a:ext cx="1246909" cy="369332"/>
+          </a:xfrm>
+          <a:prstGeom prst="rect">
+            <a:avLst/>
+          </a:prstGeom>
+          <a:noFill/>
+        </p:spPr>
+        <p:txBody>
+          <a:bodyPr wrap="square" rtlCol="0">
+            <a:spAutoFit/>
+          </a:bodyPr>
+          <a:lstStyle/>
+          <a:p>
+            <a:r>
+              <a:rPr lang="en-US" dirty="0">
+                <a:solidFill>
+                  <a:schemeClr val="bg1"/>
+                </a:solidFill>
+              </a:rPr>
+              <a:t>Node</a:t>
+            </a:r>
+          </a:p>
+        </p:txBody>
+      </p:sp>
+      <p:sp>
+        <p:nvSpPr>
+          <p:cNvPr id="14" name="TextBox 13"/>
+          <p:cNvSpPr txBox="1"/>
+          <p:nvPr/>
+        </p:nvSpPr>
+        <p:spPr>
+          <a:xfrm>
+            <a:off x="5788816" y="3390132"/>
+            <a:ext cx="1246909" cy="369332"/>
+          </a:xfrm>
+          <a:prstGeom prst="rect">
+            <a:avLst/>
+          </a:prstGeom>
+          <a:noFill/>
+        </p:spPr>
+        <p:txBody>
+          <a:bodyPr wrap="square" rtlCol="0">
+            <a:spAutoFit/>
+          </a:bodyPr>
+          <a:lstStyle/>
+          <a:p>
+            <a:r>
+              <a:rPr lang="en-US" dirty="0">
+                <a:solidFill>
+                  <a:schemeClr val="bg1"/>
+                </a:solidFill>
+              </a:rPr>
+              <a:t>Node</a:t>
+            </a:r>
+          </a:p>
+        </p:txBody>
+      </p:sp>
+      <p:sp>
+        <p:nvSpPr>
+          <p:cNvPr id="15" name="TextBox 14"/>
+          <p:cNvSpPr txBox="1"/>
+          <p:nvPr/>
+        </p:nvSpPr>
+        <p:spPr>
+          <a:xfrm>
+            <a:off x="5982395" y="2298262"/>
+            <a:ext cx="1246909" cy="369332"/>
+          </a:xfrm>
+          <a:prstGeom prst="rect">
+            <a:avLst/>
+          </a:prstGeom>
+          <a:noFill/>
+        </p:spPr>
+        <p:txBody>
+          <a:bodyPr wrap="square" rtlCol="0">
+            <a:spAutoFit/>
+          </a:bodyPr>
+          <a:lstStyle/>
+          <a:p>
+            <a:r>
+              <a:rPr lang="en-US" dirty="0">
+                <a:solidFill>
+                  <a:schemeClr val="bg1"/>
+                </a:solidFill>
+              </a:rPr>
+              <a:t>Edge</a:t>
+            </a:r>
+          </a:p>
+        </p:txBody>
+      </p:sp>
+      <p:sp>
+        <p:nvSpPr>
+          <p:cNvPr id="16" name="TextBox 15"/>
+          <p:cNvSpPr txBox="1"/>
+          <p:nvPr/>
+        </p:nvSpPr>
+        <p:spPr>
+          <a:xfrm>
+            <a:off x="7229304" y="3328862"/>
+            <a:ext cx="1246909" cy="369332"/>
+          </a:xfrm>
+          <a:prstGeom prst="rect">
+            <a:avLst/>
+          </a:prstGeom>
+          <a:noFill/>
+        </p:spPr>
+        <p:txBody>
+          <a:bodyPr wrap="square" rtlCol="0">
+            <a:spAutoFit/>
+          </a:bodyPr>
+          <a:lstStyle/>
+          <a:p>
+            <a:r>
+              <a:rPr lang="en-US" dirty="0">
+                <a:solidFill>
+                  <a:schemeClr val="bg1"/>
+                </a:solidFill>
+              </a:rPr>
+              <a:t>Edge</a:t>
+            </a:r>
+          </a:p>
+        </p:txBody>
+      </p:sp>
+      <p:sp>
+        <p:nvSpPr>
+          <p:cNvPr id="17" name="TextBox 16"/>
+          <p:cNvSpPr txBox="1"/>
+          <p:nvPr/>
+        </p:nvSpPr>
+        <p:spPr>
+          <a:xfrm>
+            <a:off x="7210914" y="2638496"/>
+            <a:ext cx="1246909" cy="369332"/>
+          </a:xfrm>
+          <a:prstGeom prst="rect">
+            <a:avLst/>
+          </a:prstGeom>
+          <a:noFill/>
+        </p:spPr>
+        <p:txBody>
+          <a:bodyPr wrap="square" rtlCol="0">
+            <a:spAutoFit/>
+          </a:bodyPr>
+          <a:lstStyle/>
+          <a:p>
+            <a:r>
+              <a:rPr lang="en-US" dirty="0">
+                <a:solidFill>
+                  <a:schemeClr val="bg1"/>
+                </a:solidFill>
+              </a:rPr>
+              <a:t>Edge</a:t>
+            </a:r>
+          </a:p>
+        </p:txBody>
+      </p:sp>
+    </p:spTree>
+    <p:extLst>
+      <p:ext uri="{BB962C8B-B14F-4D97-AF65-F5344CB8AC3E}">
+        <p14:creationId xmlns:p14="http://schemas.microsoft.com/office/powerpoint/2010/main" val="880377107"/>
+      </p:ext>
+    </p:extLst>
+  </p:cSld>
+  <p:clrMapOvr>
+    <a:masterClrMapping/>
+  </p:clrMapOvr>
+</p:sld>
+</file>
+
+<file path=ppt/slides/slide4.xml><?xml version="1.0" encoding="utf-8"?>
+<p:sld xmlns:a="http://schemas.openxmlformats.org/drawingml/2006/main" xmlns:r="http://schemas.openxmlformats.org/officeDocument/2006/relationships" xmlns:p="http://schemas.openxmlformats.org/presentationml/2006/main">
+  <p:cSld>
+    <p:spTree>
+      <p:nvGrpSpPr>
+        <p:cNvPr id="1" name=""/>
+        <p:cNvGrpSpPr/>
+        <p:nvPr/>
+      </p:nvGrpSpPr>
+      <p:grpSpPr>
+        <a:xfrm>
+          <a:off x="0" y="0"/>
+          <a:ext cx="0" cy="0"/>
+          <a:chOff x="0" y="0"/>
+          <a:chExt cx="0" cy="0"/>
+        </a:xfrm>
+      </p:grpSpPr>
+      <p:sp>
+        <p:nvSpPr>
+          <p:cNvPr id="18434" name="Rectangle 2"/>
+          <p:cNvSpPr>
+            <a:spLocks noGrp="1" noChangeArrowheads="1"/>
+          </p:cNvSpPr>
+          <p:nvPr>
+            <p:ph type="title"/>
+          </p:nvPr>
+        </p:nvSpPr>
+        <p:spPr>
+          <a:xfrm>
+            <a:off x="685800" y="1957388"/>
+            <a:ext cx="7772400" cy="579437"/>
+          </a:xfrm>
+        </p:spPr>
+        <p:txBody>
+          <a:bodyPr anchor="t"/>
+          <a:lstStyle/>
+          <a:p>
+            <a:pPr eaLnBrk="1" hangingPunct="1"/>
+            <a:endParaRPr lang="en-US" dirty="0"/>
+          </a:p>
+        </p:txBody>
+      </p:sp>
+      <p:sp>
+        <p:nvSpPr>
+          <p:cNvPr id="18435" name="Rectangle 3"/>
+          <p:cNvSpPr>
+            <a:spLocks noGrp="1" noChangeArrowheads="1"/>
+          </p:cNvSpPr>
+          <p:nvPr>
+            <p:ph type="body" idx="1"/>
+          </p:nvPr>
+        </p:nvSpPr>
+        <p:spPr/>
+        <p:txBody>
+          <a:bodyPr/>
+          <a:lstStyle/>
+          <a:p>
+            <a:pPr eaLnBrk="1" hangingPunct="1"/>
+            <a:endParaRPr lang="en-US"/>
+          </a:p>
+        </p:txBody>
+      </p:sp>
+      <p:sp>
+        <p:nvSpPr>
+          <p:cNvPr id="18436" name="Date Placeholder 7"/>
+          <p:cNvSpPr>
+            <a:spLocks noGrp="1"/>
+          </p:cNvSpPr>
+          <p:nvPr>
+            <p:ph type="dt" sz="quarter" idx="10"/>
+          </p:nvPr>
+        </p:nvSpPr>
+        <p:spPr>
+          <a:noFill/>
+        </p:spPr>
+        <p:txBody>
+          <a:bodyPr/>
+          <a:lstStyle/>
+          <a:p>
+            <a:fld id="{75FB81E4-ADE5-4B0D-9013-84BBB8D96257}" type="datetime1">
+              <a:rPr lang="en-US" smtClean="0"/>
+              <a:pPr/>
+              <a:t>5/25/2017</a:t>
+            </a:fld>
+            <a:endParaRPr lang="en-US"/>
+          </a:p>
+        </p:txBody>
+      </p:sp>
+      <p:sp>
+        <p:nvSpPr>
+          <p:cNvPr id="18437" name="Slide Number Placeholder 8"/>
+          <p:cNvSpPr>
+            <a:spLocks noGrp="1"/>
+          </p:cNvSpPr>
+          <p:nvPr>
+            <p:ph type="sldNum" sz="quarter" idx="12"/>
+          </p:nvPr>
+        </p:nvSpPr>
+        <p:spPr>
+          <a:noFill/>
+        </p:spPr>
+        <p:txBody>
+          <a:bodyPr/>
+          <a:lstStyle/>
+          <a:p>
+            <a:fld id="{CE64B86D-6B5D-43D5-BC3D-D0392806BE7A}" type="slidenum">
+              <a:rPr lang="en-US" smtClean="0"/>
+              <a:pPr/>
+              <a:t>3</a:t>
+            </a:fld>
+            <a:endParaRPr lang="en-US"/>
+          </a:p>
+        </p:txBody>
+      </p:sp>
+      <p:sp>
+        <p:nvSpPr>
+          <p:cNvPr id="18438" name="Footer Placeholder 9"/>
+          <p:cNvSpPr>
+            <a:spLocks noGrp="1"/>
+          </p:cNvSpPr>
+          <p:nvPr>
+            <p:ph type="ftr" sz="quarter" idx="11"/>
+          </p:nvPr>
+        </p:nvSpPr>
+        <p:spPr>
+          <a:noFill/>
+        </p:spPr>
+        <p:txBody>
+          <a:bodyPr/>
+          <a:lstStyle/>
+          <a:p>
+            <a:r>
+              <a:rPr lang="en-US"/>
+              <a:t>U.S. Environmental Protection Agency</a:t>
+            </a:r>
+          </a:p>
+        </p:txBody>
+      </p:sp>
+      <p:sp>
+        <p:nvSpPr>
+          <p:cNvPr id="2" name="Rectangle 1"/>
+          <p:cNvSpPr/>
+          <p:nvPr/>
+        </p:nvSpPr>
+        <p:spPr bwMode="auto">
+          <a:xfrm>
+            <a:off x="0" y="762000"/>
+            <a:ext cx="9144000" cy="5334000"/>
+          </a:xfrm>
+          <a:prstGeom prst="rect">
+            <a:avLst/>
+          </a:prstGeom>
+          <a:solidFill>
+            <a:schemeClr val="tx1"/>
+          </a:solidFill>
+          <a:ln w="9525" cap="flat" cmpd="sng" algn="ctr">
+            <a:solidFill>
+              <a:schemeClr val="tx1"/>
+            </a:solidFill>
+            <a:prstDash val="solid"/>
+            <a:round/>
+            <a:headEnd type="none" w="med" len="med"/>
+            <a:tailEnd type="none" w="med" len="med"/>
+          </a:ln>
+          <a:effectLst/>
+          <a:extLst/>
+        </p:spPr>
+        <p:txBody>
+          <a:bodyPr vert="horz" wrap="square" lIns="91440" tIns="45720" rIns="91440" bIns="45720" numCol="1" rtlCol="0" anchor="t" anchorCtr="0" compatLnSpc="1">
+            <a:prstTxWarp prst="textNoShape">
+              <a:avLst/>
+            </a:prstTxWarp>
+          </a:bodyPr>
+          <a:lstStyle/>
+          <a:p>
+            <a:pPr marL="0" marR="0" indent="0" algn="l" defTabSz="914400" rtl="0" eaLnBrk="0" fontAlgn="base" latinLnBrk="0" hangingPunct="0">
+              <a:lnSpc>
+                <a:spcPct val="100000"/>
+              </a:lnSpc>
+              <a:spcBef>
+                <a:spcPct val="0"/>
+              </a:spcBef>
+              <a:spcAft>
+                <a:spcPct val="0"/>
+              </a:spcAft>
+              <a:buClrTx/>
+              <a:buSzTx/>
+              <a:buFontTx/>
+              <a:buNone/>
+              <a:tabLst/>
+            </a:pPr>
+            <a:endParaRPr kumimoji="0" lang="en-US" sz="2400" b="0" i="0" u="none" strike="noStrike" cap="none" normalizeH="0" baseline="0">
+              <a:ln>
+                <a:noFill/>
+              </a:ln>
+              <a:solidFill>
+                <a:schemeClr val="tx1"/>
+              </a:solidFill>
+              <a:effectLst/>
+              <a:latin typeface="Arial" charset="0"/>
+              <a:ea typeface="ＭＳ Ｐゴシック" pitchFamily="1" charset="-128"/>
+            </a:endParaRPr>
+          </a:p>
+        </p:txBody>
+      </p:sp>
+      <p:pic>
+        <p:nvPicPr>
+          <p:cNvPr id="8" name="Content Placeholder 3" descr="Screen Clipping"/>
+          <p:cNvPicPr>
+            <a:picLocks noChangeAspect="1"/>
+          </p:cNvPicPr>
+          <p:nvPr/>
+        </p:nvPicPr>
+        <p:blipFill rotWithShape="1">
+          <a:blip r:embed="rId3">
+            <a:extLst>
+              <a:ext uri="{28A0092B-C50C-407E-A947-70E740481C1C}">
+                <a14:useLocalDpi xmlns:a14="http://schemas.microsoft.com/office/drawing/2010/main" val="0"/>
+              </a:ext>
+            </a:extLst>
+          </a:blip>
+          <a:srcRect l="57273" t="20621" b="31166"/>
+          <a:stretch/>
+        </p:blipFill>
+        <p:spPr>
+          <a:xfrm>
+            <a:off x="0" y="771524"/>
+            <a:ext cx="4888779" cy="5337176"/>
+          </a:xfrm>
+          <a:prstGeom prst="rect">
+            <a:avLst/>
+          </a:prstGeom>
+        </p:spPr>
+      </p:pic>
+      <p:sp>
+        <p:nvSpPr>
+          <p:cNvPr id="4" name="Rectangle 3"/>
+          <p:cNvSpPr/>
+          <p:nvPr/>
+        </p:nvSpPr>
+        <p:spPr>
+          <a:xfrm>
+            <a:off x="1621559" y="170160"/>
+            <a:ext cx="5900882" cy="461665"/>
+          </a:xfrm>
+          <a:prstGeom prst="rect">
+            <a:avLst/>
+          </a:prstGeom>
+        </p:spPr>
+        <p:txBody>
+          <a:bodyPr wrap="square">
+            <a:spAutoFit/>
+          </a:bodyPr>
+          <a:lstStyle/>
+          <a:p>
+            <a:pPr algn="ctr"/>
+            <a:r>
+              <a:rPr lang="en-US" dirty="0">
+                <a:solidFill>
+                  <a:srgbClr val="026CB6"/>
+                </a:solidFill>
+              </a:rPr>
+              <a:t>The Complete AOPwiki Network</a:t>
+            </a:r>
+          </a:p>
+        </p:txBody>
+      </p:sp>
+      <p:sp>
+        <p:nvSpPr>
+          <p:cNvPr id="3" name="Rectangle 2"/>
+          <p:cNvSpPr/>
+          <p:nvPr/>
+        </p:nvSpPr>
+        <p:spPr bwMode="auto">
+          <a:xfrm>
+            <a:off x="0" y="762000"/>
+            <a:ext cx="4876800" cy="5334000"/>
+          </a:xfrm>
+          <a:prstGeom prst="rect">
+            <a:avLst/>
+          </a:prstGeom>
+          <a:solidFill>
+            <a:schemeClr val="tx1">
+              <a:alpha val="78000"/>
+            </a:schemeClr>
+          </a:solidFill>
+          <a:ln w="9525" cap="flat" cmpd="sng" algn="ctr">
+            <a:solidFill>
+              <a:schemeClr val="tx1"/>
+            </a:solidFill>
+            <a:prstDash val="solid"/>
+            <a:round/>
+            <a:headEnd type="none" w="med" len="med"/>
+            <a:tailEnd type="none" w="med" len="med"/>
+          </a:ln>
+          <a:effectLst/>
+          <a:extLst/>
+        </p:spPr>
+        <p:txBody>
+          <a:bodyPr vert="horz" wrap="square" lIns="91440" tIns="45720" rIns="91440" bIns="45720" numCol="1" rtlCol="0" anchor="t" anchorCtr="0" compatLnSpc="1">
+            <a:prstTxWarp prst="textNoShape">
+              <a:avLst/>
+            </a:prstTxWarp>
+          </a:bodyPr>
+          <a:lstStyle/>
+          <a:p>
+            <a:pPr marL="0" marR="0" indent="0" algn="l" defTabSz="914400" rtl="0" eaLnBrk="0" fontAlgn="base" latinLnBrk="0" hangingPunct="0">
+              <a:lnSpc>
+                <a:spcPct val="100000"/>
+              </a:lnSpc>
+              <a:spcBef>
+                <a:spcPct val="0"/>
+              </a:spcBef>
+              <a:spcAft>
+                <a:spcPct val="0"/>
+              </a:spcAft>
+              <a:buClrTx/>
+              <a:buSzTx/>
+              <a:buFontTx/>
+              <a:buNone/>
+              <a:tabLst/>
+            </a:pPr>
+            <a:endParaRPr kumimoji="0" lang="en-US" sz="2400" b="0" i="0" u="none" strike="noStrike" cap="none" normalizeH="0" baseline="0">
+              <a:ln>
+                <a:noFill/>
+              </a:ln>
+              <a:solidFill>
+                <a:schemeClr val="tx1"/>
+              </a:solidFill>
+              <a:effectLst/>
+              <a:latin typeface="Arial" charset="0"/>
+              <a:ea typeface="ＭＳ Ｐゴシック" pitchFamily="1" charset="-128"/>
+            </a:endParaRPr>
+          </a:p>
+        </p:txBody>
+      </p:sp>
+      <p:pic>
+        <p:nvPicPr>
+          <p:cNvPr id="11" name="Picture 10"/>
+          <p:cNvPicPr>
+            <a:picLocks noChangeAspect="1"/>
+          </p:cNvPicPr>
+          <p:nvPr/>
+        </p:nvPicPr>
+        <p:blipFill>
+          <a:blip r:embed="rId4"/>
+          <a:stretch>
+            <a:fillRect/>
+          </a:stretch>
+        </p:blipFill>
+        <p:spPr>
+          <a:xfrm>
+            <a:off x="5393435" y="805339"/>
+            <a:ext cx="2560108" cy="2304097"/>
+          </a:xfrm>
+          <a:prstGeom prst="rect">
+            <a:avLst/>
+          </a:prstGeom>
+        </p:spPr>
+      </p:pic>
+      <p:pic>
+        <p:nvPicPr>
+          <p:cNvPr id="12" name="Picture 11"/>
+          <p:cNvPicPr>
+            <a:picLocks noChangeAspect="1"/>
+          </p:cNvPicPr>
+          <p:nvPr/>
+        </p:nvPicPr>
+        <p:blipFill>
+          <a:blip r:embed="rId5"/>
+          <a:stretch>
+            <a:fillRect/>
+          </a:stretch>
+        </p:blipFill>
+        <p:spPr>
+          <a:xfrm>
+            <a:off x="5521155" y="3320312"/>
+            <a:ext cx="2560108" cy="2304097"/>
+          </a:xfrm>
+          <a:prstGeom prst="rect">
+            <a:avLst/>
+          </a:prstGeom>
+        </p:spPr>
+      </p:pic>
+    </p:spTree>
+    <p:extLst>
+      <p:ext uri="{BB962C8B-B14F-4D97-AF65-F5344CB8AC3E}">
+        <p14:creationId xmlns:p14="http://schemas.microsoft.com/office/powerpoint/2010/main" val="3939061973"/>
+      </p:ext>
+    </p:extLst>
+  </p:cSld>
+  <p:clrMapOvr>
+    <a:masterClrMapping/>
+  </p:clrMapOvr>
+</p:sld>
+</file>
+
+<file path=ppt/slides/slide5.xml><?xml version="1.0" encoding="utf-8"?>
+<p:sld xmlns:a="http://schemas.openxmlformats.org/drawingml/2006/main" xmlns:r="http://schemas.openxmlformats.org/officeDocument/2006/relationships" xmlns:p="http://schemas.openxmlformats.org/presentationml/2006/main">
+  <p:cSld>
+    <p:spTree>
+      <p:nvGrpSpPr>
+        <p:cNvPr id="1" name=""/>
+        <p:cNvGrpSpPr/>
+        <p:nvPr/>
+      </p:nvGrpSpPr>
+      <p:grpSpPr>
+        <a:xfrm>
+          <a:off x="0" y="0"/>
+          <a:ext cx="0" cy="0"/>
+          <a:chOff x="0" y="0"/>
+          <a:chExt cx="0" cy="0"/>
+        </a:xfrm>
+      </p:grpSpPr>
+      <p:sp>
+        <p:nvSpPr>
+          <p:cNvPr id="18434" name="Rectangle 2"/>
+          <p:cNvSpPr>
+            <a:spLocks noGrp="1" noChangeArrowheads="1"/>
+          </p:cNvSpPr>
+          <p:nvPr>
+            <p:ph type="title"/>
+          </p:nvPr>
+        </p:nvSpPr>
+        <p:spPr>
+          <a:xfrm>
+            <a:off x="685800" y="1957388"/>
+            <a:ext cx="7772400" cy="579437"/>
+          </a:xfrm>
+        </p:spPr>
+        <p:txBody>
+          <a:bodyPr anchor="t"/>
+          <a:lstStyle/>
+          <a:p>
+            <a:pPr eaLnBrk="1" hangingPunct="1"/>
+            <a:endParaRPr lang="en-US" dirty="0"/>
+          </a:p>
+        </p:txBody>
+      </p:sp>
+      <p:sp>
+        <p:nvSpPr>
+          <p:cNvPr id="18435" name="Rectangle 3"/>
+          <p:cNvSpPr>
+            <a:spLocks noGrp="1" noChangeArrowheads="1"/>
+          </p:cNvSpPr>
+          <p:nvPr>
+            <p:ph type="body" idx="1"/>
+          </p:nvPr>
+        </p:nvSpPr>
+        <p:spPr/>
+        <p:txBody>
+          <a:bodyPr/>
+          <a:lstStyle/>
+          <a:p>
+            <a:pPr eaLnBrk="1" hangingPunct="1"/>
+            <a:endParaRPr lang="en-US"/>
+          </a:p>
+        </p:txBody>
+      </p:sp>
+      <p:sp>
+        <p:nvSpPr>
+          <p:cNvPr id="18436" name="Date Placeholder 7"/>
+          <p:cNvSpPr>
+            <a:spLocks noGrp="1"/>
+          </p:cNvSpPr>
+          <p:nvPr>
+            <p:ph type="dt" sz="quarter" idx="10"/>
+          </p:nvPr>
+        </p:nvSpPr>
+        <p:spPr>
+          <a:noFill/>
+        </p:spPr>
+        <p:txBody>
+          <a:bodyPr/>
+          <a:lstStyle/>
+          <a:p>
+            <a:fld id="{75FB81E4-ADE5-4B0D-9013-84BBB8D96257}" type="datetime1">
+              <a:rPr lang="en-US" smtClean="0"/>
+              <a:pPr/>
+              <a:t>5/25/2017</a:t>
+            </a:fld>
+            <a:endParaRPr lang="en-US"/>
+          </a:p>
+        </p:txBody>
+      </p:sp>
+      <p:sp>
+        <p:nvSpPr>
+          <p:cNvPr id="18437" name="Slide Number Placeholder 8"/>
+          <p:cNvSpPr>
+            <a:spLocks noGrp="1"/>
+          </p:cNvSpPr>
+          <p:nvPr>
+            <p:ph type="sldNum" sz="quarter" idx="12"/>
+          </p:nvPr>
+        </p:nvSpPr>
+        <p:spPr>
+          <a:noFill/>
+        </p:spPr>
+        <p:txBody>
+          <a:bodyPr/>
+          <a:lstStyle/>
+          <a:p>
+            <a:fld id="{CE64B86D-6B5D-43D5-BC3D-D0392806BE7A}" type="slidenum">
+              <a:rPr lang="en-US" smtClean="0"/>
+              <a:pPr/>
+              <a:t>4</a:t>
+            </a:fld>
+            <a:endParaRPr lang="en-US"/>
+          </a:p>
+        </p:txBody>
+      </p:sp>
+      <p:sp>
+        <p:nvSpPr>
+          <p:cNvPr id="18438" name="Footer Placeholder 9"/>
+          <p:cNvSpPr>
+            <a:spLocks noGrp="1"/>
+          </p:cNvSpPr>
+          <p:nvPr>
+            <p:ph type="ftr" sz="quarter" idx="11"/>
+          </p:nvPr>
+        </p:nvSpPr>
+        <p:spPr>
+          <a:noFill/>
+        </p:spPr>
+        <p:txBody>
+          <a:bodyPr/>
+          <a:lstStyle/>
+          <a:p>
+            <a:r>
+              <a:rPr lang="en-US"/>
+              <a:t>U.S. Environmental Protection Agency</a:t>
+            </a:r>
+          </a:p>
+        </p:txBody>
+      </p:sp>
+      <p:sp>
+        <p:nvSpPr>
+          <p:cNvPr id="2" name="Rectangle 1"/>
+          <p:cNvSpPr/>
+          <p:nvPr/>
+        </p:nvSpPr>
+        <p:spPr bwMode="auto">
+          <a:xfrm>
+            <a:off x="0" y="762000"/>
+            <a:ext cx="9144000" cy="5334000"/>
+          </a:xfrm>
+          <a:prstGeom prst="rect">
+            <a:avLst/>
+          </a:prstGeom>
+          <a:solidFill>
+            <a:schemeClr val="tx1"/>
+          </a:solidFill>
+          <a:ln w="9525" cap="flat" cmpd="sng" algn="ctr">
+            <a:solidFill>
+              <a:schemeClr val="tx1"/>
+            </a:solidFill>
+            <a:prstDash val="solid"/>
+            <a:round/>
+            <a:headEnd type="none" w="med" len="med"/>
+            <a:tailEnd type="none" w="med" len="med"/>
+          </a:ln>
+          <a:effectLst/>
+          <a:extLst/>
+        </p:spPr>
+        <p:txBody>
+          <a:bodyPr vert="horz" wrap="square" lIns="91440" tIns="45720" rIns="91440" bIns="45720" numCol="1" rtlCol="0" anchor="t" anchorCtr="0" compatLnSpc="1">
+            <a:prstTxWarp prst="textNoShape">
+              <a:avLst/>
+            </a:prstTxWarp>
+          </a:bodyPr>
+          <a:lstStyle/>
+          <a:p>
+            <a:pPr marL="0" marR="0" indent="0" algn="l" defTabSz="914400" rtl="0" eaLnBrk="0" fontAlgn="base" latinLnBrk="0" hangingPunct="0">
+              <a:lnSpc>
+                <a:spcPct val="100000"/>
+              </a:lnSpc>
+              <a:spcBef>
+                <a:spcPct val="0"/>
+              </a:spcBef>
+              <a:spcAft>
+                <a:spcPct val="0"/>
+              </a:spcAft>
+              <a:buClrTx/>
+              <a:buSzTx/>
+              <a:buFontTx/>
+              <a:buNone/>
+              <a:tabLst/>
+            </a:pPr>
+            <a:endParaRPr kumimoji="0" lang="en-US" sz="2400" b="0" i="0" u="none" strike="noStrike" cap="none" normalizeH="0" baseline="0">
+              <a:ln>
+                <a:noFill/>
+              </a:ln>
+              <a:solidFill>
+                <a:schemeClr val="tx1"/>
+              </a:solidFill>
+              <a:effectLst/>
+              <a:latin typeface="Arial" charset="0"/>
+              <a:ea typeface="ＭＳ Ｐゴシック" pitchFamily="1" charset="-128"/>
+            </a:endParaRPr>
+          </a:p>
+        </p:txBody>
+      </p:sp>
       <p:pic>
         <p:nvPicPr>
           <p:cNvPr id="8" name="Content Placeholder 3" descr="Screen Clipping"/>
@@ -3497,6 +5035,710 @@
         </p:blipFill>
         <p:spPr>
           <a:xfrm>
+            <a:off x="1881043" y="762000"/>
+            <a:ext cx="5381914" cy="5207000"/>
+          </a:xfrm>
+          <a:prstGeom prst="rect">
+            <a:avLst/>
+          </a:prstGeom>
+        </p:spPr>
+      </p:pic>
+      <p:sp>
+        <p:nvSpPr>
+          <p:cNvPr id="4" name="Rectangle 3"/>
+          <p:cNvSpPr/>
+          <p:nvPr/>
+        </p:nvSpPr>
+        <p:spPr>
+          <a:xfrm>
+            <a:off x="1621559" y="170160"/>
+            <a:ext cx="5900882" cy="461665"/>
+          </a:xfrm>
+          <a:prstGeom prst="rect">
+            <a:avLst/>
+          </a:prstGeom>
+        </p:spPr>
+        <p:txBody>
+          <a:bodyPr wrap="square">
+            <a:spAutoFit/>
+          </a:bodyPr>
+          <a:lstStyle/>
+          <a:p>
+            <a:pPr algn="ctr"/>
+            <a:r>
+              <a:rPr lang="en-US" dirty="0">
+                <a:solidFill>
+                  <a:srgbClr val="026CB6"/>
+                </a:solidFill>
+              </a:rPr>
+              <a:t>The Complete AOPwiki Network</a:t>
+            </a:r>
+          </a:p>
+        </p:txBody>
+      </p:sp>
+      <p:sp>
+        <p:nvSpPr>
+          <p:cNvPr id="7" name="Rectangle 6"/>
+          <p:cNvSpPr/>
+          <p:nvPr/>
+        </p:nvSpPr>
+        <p:spPr>
+          <a:xfrm>
+            <a:off x="851333" y="5835168"/>
+            <a:ext cx="7441334" cy="286232"/>
+          </a:xfrm>
+          <a:prstGeom prst="rect">
+            <a:avLst/>
+          </a:prstGeom>
+        </p:spPr>
+        <p:txBody>
+          <a:bodyPr wrap="square">
+            <a:spAutoFit/>
+          </a:bodyPr>
+          <a:lstStyle/>
+          <a:p>
+            <a:pPr lvl="0" algn="ctr" eaLnBrk="1" fontAlgn="auto" hangingPunct="1">
+              <a:lnSpc>
+                <a:spcPct val="90000"/>
+              </a:lnSpc>
+              <a:spcBef>
+                <a:spcPts val="1000"/>
+              </a:spcBef>
+              <a:spcAft>
+                <a:spcPts val="0"/>
+              </a:spcAft>
+            </a:pPr>
+            <a:r>
+              <a:rPr lang="en-US" sz="1400" dirty="0">
+                <a:solidFill>
+                  <a:prstClr val="white"/>
+                </a:solidFill>
+                <a:latin typeface="Calibri" panose="020F0502020204030204"/>
+                <a:ea typeface="+mn-ea"/>
+              </a:rPr>
+              <a:t>A network diagram of the Adverse Outcome Pathway Wiki database of AOPs (As of: April 10</a:t>
+            </a:r>
+            <a:r>
+              <a:rPr lang="en-US" sz="1400" baseline="30000" dirty="0">
+                <a:solidFill>
+                  <a:prstClr val="white"/>
+                </a:solidFill>
+                <a:latin typeface="Calibri" panose="020F0502020204030204"/>
+                <a:ea typeface="+mn-ea"/>
+              </a:rPr>
+              <a:t>th</a:t>
+            </a:r>
+            <a:r>
+              <a:rPr lang="en-US" sz="1400" dirty="0">
+                <a:solidFill>
+                  <a:prstClr val="white"/>
+                </a:solidFill>
+                <a:latin typeface="Calibri" panose="020F0502020204030204"/>
+                <a:ea typeface="+mn-ea"/>
+              </a:rPr>
+              <a:t>, 2017)</a:t>
+            </a:r>
+          </a:p>
+        </p:txBody>
+      </p:sp>
+    </p:spTree>
+    <p:extLst>
+      <p:ext uri="{BB962C8B-B14F-4D97-AF65-F5344CB8AC3E}">
+        <p14:creationId xmlns:p14="http://schemas.microsoft.com/office/powerpoint/2010/main" val="2297782639"/>
+      </p:ext>
+    </p:extLst>
+  </p:cSld>
+  <p:clrMapOvr>
+    <a:masterClrMapping/>
+  </p:clrMapOvr>
+  <mc:AlternateContent xmlns:mc="http://schemas.openxmlformats.org/markup-compatibility/2006">
+    <mc:Choice xmlns:p159="http://schemas.microsoft.com/office/powerpoint/2015/09/main" Requires="p159">
+      <p:transition xmlns:p14="http://schemas.microsoft.com/office/powerpoint/2010/main" spd="slow" p14:dur="2000">
+        <p159:morph option="byObject"/>
+      </p:transition>
+    </mc:Choice>
+    <mc:Fallback>
+      <p:transition spd="slow">
+        <p:fade/>
+      </p:transition>
+    </mc:Fallback>
+  </mc:AlternateContent>
+</p:sld>
+</file>
+
+<file path=ppt/slides/slide6.xml><?xml version="1.0" encoding="utf-8"?>
+<p:sld xmlns:a="http://schemas.openxmlformats.org/drawingml/2006/main" xmlns:r="http://schemas.openxmlformats.org/officeDocument/2006/relationships" xmlns:p="http://schemas.openxmlformats.org/presentationml/2006/main">
+  <p:cSld>
+    <p:spTree>
+      <p:nvGrpSpPr>
+        <p:cNvPr id="1" name=""/>
+        <p:cNvGrpSpPr/>
+        <p:nvPr/>
+      </p:nvGrpSpPr>
+      <p:grpSpPr>
+        <a:xfrm>
+          <a:off x="0" y="0"/>
+          <a:ext cx="0" cy="0"/>
+          <a:chOff x="0" y="0"/>
+          <a:chExt cx="0" cy="0"/>
+        </a:xfrm>
+      </p:grpSpPr>
+      <p:sp>
+        <p:nvSpPr>
+          <p:cNvPr id="18434" name="Rectangle 2"/>
+          <p:cNvSpPr>
+            <a:spLocks noGrp="1" noChangeArrowheads="1"/>
+          </p:cNvSpPr>
+          <p:nvPr>
+            <p:ph type="title"/>
+          </p:nvPr>
+        </p:nvSpPr>
+        <p:spPr>
+          <a:xfrm>
+            <a:off x="685800" y="1957388"/>
+            <a:ext cx="7772400" cy="579437"/>
+          </a:xfrm>
+        </p:spPr>
+        <p:txBody>
+          <a:bodyPr anchor="t"/>
+          <a:lstStyle/>
+          <a:p>
+            <a:pPr eaLnBrk="1" hangingPunct="1"/>
+            <a:endParaRPr lang="en-US" dirty="0"/>
+          </a:p>
+        </p:txBody>
+      </p:sp>
+      <p:sp>
+        <p:nvSpPr>
+          <p:cNvPr id="18435" name="Rectangle 3"/>
+          <p:cNvSpPr>
+            <a:spLocks noGrp="1" noChangeArrowheads="1"/>
+          </p:cNvSpPr>
+          <p:nvPr>
+            <p:ph type="body" idx="1"/>
+          </p:nvPr>
+        </p:nvSpPr>
+        <p:spPr/>
+        <p:txBody>
+          <a:bodyPr/>
+          <a:lstStyle/>
+          <a:p>
+            <a:pPr eaLnBrk="1" hangingPunct="1"/>
+            <a:endParaRPr lang="en-US"/>
+          </a:p>
+        </p:txBody>
+      </p:sp>
+      <p:sp>
+        <p:nvSpPr>
+          <p:cNvPr id="18436" name="Date Placeholder 7"/>
+          <p:cNvSpPr>
+            <a:spLocks noGrp="1"/>
+          </p:cNvSpPr>
+          <p:nvPr>
+            <p:ph type="dt" sz="quarter" idx="10"/>
+          </p:nvPr>
+        </p:nvSpPr>
+        <p:spPr>
+          <a:noFill/>
+        </p:spPr>
+        <p:txBody>
+          <a:bodyPr/>
+          <a:lstStyle/>
+          <a:p>
+            <a:fld id="{75FB81E4-ADE5-4B0D-9013-84BBB8D96257}" type="datetime1">
+              <a:rPr lang="en-US" smtClean="0"/>
+              <a:pPr/>
+              <a:t>5/25/2017</a:t>
+            </a:fld>
+            <a:endParaRPr lang="en-US"/>
+          </a:p>
+        </p:txBody>
+      </p:sp>
+      <p:sp>
+        <p:nvSpPr>
+          <p:cNvPr id="18437" name="Slide Number Placeholder 8"/>
+          <p:cNvSpPr>
+            <a:spLocks noGrp="1"/>
+          </p:cNvSpPr>
+          <p:nvPr>
+            <p:ph type="sldNum" sz="quarter" idx="12"/>
+          </p:nvPr>
+        </p:nvSpPr>
+        <p:spPr>
+          <a:noFill/>
+        </p:spPr>
+        <p:txBody>
+          <a:bodyPr/>
+          <a:lstStyle/>
+          <a:p>
+            <a:fld id="{CE64B86D-6B5D-43D5-BC3D-D0392806BE7A}" type="slidenum">
+              <a:rPr lang="en-US" smtClean="0"/>
+              <a:pPr/>
+              <a:t>5</a:t>
+            </a:fld>
+            <a:endParaRPr lang="en-US"/>
+          </a:p>
+        </p:txBody>
+      </p:sp>
+      <p:sp>
+        <p:nvSpPr>
+          <p:cNvPr id="18438" name="Footer Placeholder 9"/>
+          <p:cNvSpPr>
+            <a:spLocks noGrp="1"/>
+          </p:cNvSpPr>
+          <p:nvPr>
+            <p:ph type="ftr" sz="quarter" idx="11"/>
+          </p:nvPr>
+        </p:nvSpPr>
+        <p:spPr>
+          <a:noFill/>
+        </p:spPr>
+        <p:txBody>
+          <a:bodyPr/>
+          <a:lstStyle/>
+          <a:p>
+            <a:r>
+              <a:rPr lang="en-US"/>
+              <a:t>U.S. Environmental Protection Agency</a:t>
+            </a:r>
+          </a:p>
+        </p:txBody>
+      </p:sp>
+      <p:sp>
+        <p:nvSpPr>
+          <p:cNvPr id="2" name="Rectangle 1"/>
+          <p:cNvSpPr/>
+          <p:nvPr/>
+        </p:nvSpPr>
+        <p:spPr bwMode="auto">
+          <a:xfrm>
+            <a:off x="0" y="762000"/>
+            <a:ext cx="9144000" cy="5334000"/>
+          </a:xfrm>
+          <a:prstGeom prst="rect">
+            <a:avLst/>
+          </a:prstGeom>
+          <a:solidFill>
+            <a:schemeClr val="tx1"/>
+          </a:solidFill>
+          <a:ln w="9525" cap="flat" cmpd="sng" algn="ctr">
+            <a:solidFill>
+              <a:schemeClr val="tx1"/>
+            </a:solidFill>
+            <a:prstDash val="solid"/>
+            <a:round/>
+            <a:headEnd type="none" w="med" len="med"/>
+            <a:tailEnd type="none" w="med" len="med"/>
+          </a:ln>
+          <a:effectLst/>
+          <a:extLst/>
+        </p:spPr>
+        <p:txBody>
+          <a:bodyPr vert="horz" wrap="square" lIns="91440" tIns="45720" rIns="91440" bIns="45720" numCol="1" rtlCol="0" anchor="t" anchorCtr="0" compatLnSpc="1">
+            <a:prstTxWarp prst="textNoShape">
+              <a:avLst/>
+            </a:prstTxWarp>
+          </a:bodyPr>
+          <a:lstStyle/>
+          <a:p>
+            <a:pPr marL="0" marR="0" indent="0" algn="l" defTabSz="914400" rtl="0" eaLnBrk="0" fontAlgn="base" latinLnBrk="0" hangingPunct="0">
+              <a:lnSpc>
+                <a:spcPct val="100000"/>
+              </a:lnSpc>
+              <a:spcBef>
+                <a:spcPct val="0"/>
+              </a:spcBef>
+              <a:spcAft>
+                <a:spcPct val="0"/>
+              </a:spcAft>
+              <a:buClrTx/>
+              <a:buSzTx/>
+              <a:buFontTx/>
+              <a:buNone/>
+              <a:tabLst/>
+            </a:pPr>
+            <a:endParaRPr kumimoji="0" lang="en-US" sz="2400" b="0" i="0" u="none" strike="noStrike" cap="none" normalizeH="0" baseline="0">
+              <a:ln>
+                <a:noFill/>
+              </a:ln>
+              <a:solidFill>
+                <a:schemeClr val="tx1"/>
+              </a:solidFill>
+              <a:effectLst/>
+              <a:latin typeface="Arial" charset="0"/>
+              <a:ea typeface="ＭＳ Ｐゴシック" pitchFamily="1" charset="-128"/>
+            </a:endParaRPr>
+          </a:p>
+        </p:txBody>
+      </p:sp>
+      <p:pic>
+        <p:nvPicPr>
+          <p:cNvPr id="8" name="Content Placeholder 3" descr="Screen Clipping"/>
+          <p:cNvPicPr>
+            <a:picLocks noChangeAspect="1"/>
+          </p:cNvPicPr>
+          <p:nvPr/>
+        </p:nvPicPr>
+        <p:blipFill>
+          <a:blip r:embed="rId3">
+            <a:extLst>
+              <a:ext uri="{28A0092B-C50C-407E-A947-70E740481C1C}">
+                <a14:useLocalDpi xmlns:a14="http://schemas.microsoft.com/office/drawing/2010/main" val="0"/>
+              </a:ext>
+            </a:extLst>
+          </a:blip>
+          <a:stretch>
+            <a:fillRect/>
+          </a:stretch>
+        </p:blipFill>
+        <p:spPr>
+          <a:xfrm>
+            <a:off x="1881043" y="762000"/>
+            <a:ext cx="5381914" cy="5207000"/>
+          </a:xfrm>
+          <a:prstGeom prst="rect">
+            <a:avLst/>
+          </a:prstGeom>
+        </p:spPr>
+      </p:pic>
+      <p:sp>
+        <p:nvSpPr>
+          <p:cNvPr id="4" name="Rectangle 3"/>
+          <p:cNvSpPr/>
+          <p:nvPr/>
+        </p:nvSpPr>
+        <p:spPr>
+          <a:xfrm>
+            <a:off x="1621559" y="170160"/>
+            <a:ext cx="5900882" cy="461665"/>
+          </a:xfrm>
+          <a:prstGeom prst="rect">
+            <a:avLst/>
+          </a:prstGeom>
+        </p:spPr>
+        <p:txBody>
+          <a:bodyPr wrap="square">
+            <a:spAutoFit/>
+          </a:bodyPr>
+          <a:lstStyle/>
+          <a:p>
+            <a:pPr algn="ctr"/>
+            <a:r>
+              <a:rPr lang="en-US" dirty="0">
+                <a:solidFill>
+                  <a:srgbClr val="026CB6"/>
+                </a:solidFill>
+              </a:rPr>
+              <a:t>The Complete AOPwiki Network</a:t>
+            </a:r>
+          </a:p>
+        </p:txBody>
+      </p:sp>
+      <p:sp>
+        <p:nvSpPr>
+          <p:cNvPr id="7" name="Rectangle 6"/>
+          <p:cNvSpPr/>
+          <p:nvPr/>
+        </p:nvSpPr>
+        <p:spPr>
+          <a:xfrm>
+            <a:off x="851333" y="5835168"/>
+            <a:ext cx="7441334" cy="286232"/>
+          </a:xfrm>
+          <a:prstGeom prst="rect">
+            <a:avLst/>
+          </a:prstGeom>
+        </p:spPr>
+        <p:txBody>
+          <a:bodyPr wrap="square">
+            <a:spAutoFit/>
+          </a:bodyPr>
+          <a:lstStyle/>
+          <a:p>
+            <a:pPr lvl="0" algn="ctr" eaLnBrk="1" fontAlgn="auto" hangingPunct="1">
+              <a:lnSpc>
+                <a:spcPct val="90000"/>
+              </a:lnSpc>
+              <a:spcBef>
+                <a:spcPts val="1000"/>
+              </a:spcBef>
+              <a:spcAft>
+                <a:spcPts val="0"/>
+              </a:spcAft>
+            </a:pPr>
+            <a:r>
+              <a:rPr lang="en-US" sz="1400" dirty="0">
+                <a:solidFill>
+                  <a:prstClr val="white"/>
+                </a:solidFill>
+                <a:latin typeface="Calibri" panose="020F0502020204030204"/>
+                <a:ea typeface="+mn-ea"/>
+              </a:rPr>
+              <a:t>A network diagram of the Adverse Outcome Pathway Wiki database of AOPs (As of: April 10</a:t>
+            </a:r>
+            <a:r>
+              <a:rPr lang="en-US" sz="1400" baseline="30000" dirty="0">
+                <a:solidFill>
+                  <a:prstClr val="white"/>
+                </a:solidFill>
+                <a:latin typeface="Calibri" panose="020F0502020204030204"/>
+                <a:ea typeface="+mn-ea"/>
+              </a:rPr>
+              <a:t>th</a:t>
+            </a:r>
+            <a:r>
+              <a:rPr lang="en-US" sz="1400" dirty="0">
+                <a:solidFill>
+                  <a:prstClr val="white"/>
+                </a:solidFill>
+                <a:latin typeface="Calibri" panose="020F0502020204030204"/>
+                <a:ea typeface="+mn-ea"/>
+              </a:rPr>
+              <a:t>, 2017)</a:t>
+            </a:r>
+          </a:p>
+        </p:txBody>
+      </p:sp>
+    </p:spTree>
+    <p:extLst>
+      <p:ext uri="{BB962C8B-B14F-4D97-AF65-F5344CB8AC3E}">
+        <p14:creationId xmlns:p14="http://schemas.microsoft.com/office/powerpoint/2010/main" val="307508938"/>
+      </p:ext>
+    </p:extLst>
+  </p:cSld>
+  <p:clrMapOvr>
+    <a:masterClrMapping/>
+  </p:clrMapOvr>
+</p:sld>
+</file>
+
+<file path=ppt/slides/slide7.xml><?xml version="1.0" encoding="utf-8"?>
+<p:sld xmlns:a="http://schemas.openxmlformats.org/drawingml/2006/main" xmlns:r="http://schemas.openxmlformats.org/officeDocument/2006/relationships" xmlns:p="http://schemas.openxmlformats.org/presentationml/2006/main">
+  <p:cSld>
+    <p:spTree>
+      <p:nvGrpSpPr>
+        <p:cNvPr id="1" name=""/>
+        <p:cNvGrpSpPr/>
+        <p:nvPr/>
+      </p:nvGrpSpPr>
+      <p:grpSpPr>
+        <a:xfrm>
+          <a:off x="0" y="0"/>
+          <a:ext cx="0" cy="0"/>
+          <a:chOff x="0" y="0"/>
+          <a:chExt cx="0" cy="0"/>
+        </a:xfrm>
+      </p:grpSpPr>
+      <p:sp>
+        <p:nvSpPr>
+          <p:cNvPr id="18434" name="Rectangle 2"/>
+          <p:cNvSpPr>
+            <a:spLocks noGrp="1" noChangeArrowheads="1"/>
+          </p:cNvSpPr>
+          <p:nvPr>
+            <p:ph type="title"/>
+          </p:nvPr>
+        </p:nvSpPr>
+        <p:spPr>
+          <a:xfrm>
+            <a:off x="685800" y="1957388"/>
+            <a:ext cx="7772400" cy="579437"/>
+          </a:xfrm>
+        </p:spPr>
+        <p:txBody>
+          <a:bodyPr anchor="t"/>
+          <a:lstStyle/>
+          <a:p>
+            <a:pPr eaLnBrk="1" hangingPunct="1"/>
+            <a:endParaRPr lang="en-US" dirty="0"/>
+          </a:p>
+        </p:txBody>
+      </p:sp>
+      <p:sp>
+        <p:nvSpPr>
+          <p:cNvPr id="18435" name="Rectangle 3"/>
+          <p:cNvSpPr>
+            <a:spLocks noGrp="1" noChangeArrowheads="1"/>
+          </p:cNvSpPr>
+          <p:nvPr>
+            <p:ph type="body" idx="1"/>
+          </p:nvPr>
+        </p:nvSpPr>
+        <p:spPr/>
+        <p:txBody>
+          <a:bodyPr/>
+          <a:lstStyle/>
+          <a:p>
+            <a:pPr eaLnBrk="1" hangingPunct="1"/>
+            <a:endParaRPr lang="en-US"/>
+          </a:p>
+        </p:txBody>
+      </p:sp>
+      <p:sp>
+        <p:nvSpPr>
+          <p:cNvPr id="18436" name="Date Placeholder 7"/>
+          <p:cNvSpPr>
+            <a:spLocks noGrp="1"/>
+          </p:cNvSpPr>
+          <p:nvPr>
+            <p:ph type="dt" sz="quarter" idx="10"/>
+          </p:nvPr>
+        </p:nvSpPr>
+        <p:spPr>
+          <a:noFill/>
+        </p:spPr>
+        <p:txBody>
+          <a:bodyPr/>
+          <a:lstStyle/>
+          <a:p>
+            <a:fld id="{75FB81E4-ADE5-4B0D-9013-84BBB8D96257}" type="datetime1">
+              <a:rPr lang="en-US" smtClean="0"/>
+              <a:pPr/>
+              <a:t>5/25/2017</a:t>
+            </a:fld>
+            <a:endParaRPr lang="en-US"/>
+          </a:p>
+        </p:txBody>
+      </p:sp>
+      <p:sp>
+        <p:nvSpPr>
+          <p:cNvPr id="18437" name="Slide Number Placeholder 8"/>
+          <p:cNvSpPr>
+            <a:spLocks noGrp="1"/>
+          </p:cNvSpPr>
+          <p:nvPr>
+            <p:ph type="sldNum" sz="quarter" idx="12"/>
+          </p:nvPr>
+        </p:nvSpPr>
+        <p:spPr>
+          <a:noFill/>
+        </p:spPr>
+        <p:txBody>
+          <a:bodyPr/>
+          <a:lstStyle/>
+          <a:p>
+            <a:fld id="{CE64B86D-6B5D-43D5-BC3D-D0392806BE7A}" type="slidenum">
+              <a:rPr lang="en-US" smtClean="0"/>
+              <a:pPr/>
+              <a:t>6</a:t>
+            </a:fld>
+            <a:endParaRPr lang="en-US"/>
+          </a:p>
+        </p:txBody>
+      </p:sp>
+      <p:sp>
+        <p:nvSpPr>
+          <p:cNvPr id="18438" name="Footer Placeholder 9"/>
+          <p:cNvSpPr>
+            <a:spLocks noGrp="1"/>
+          </p:cNvSpPr>
+          <p:nvPr>
+            <p:ph type="ftr" sz="quarter" idx="11"/>
+          </p:nvPr>
+        </p:nvSpPr>
+        <p:spPr>
+          <a:noFill/>
+        </p:spPr>
+        <p:txBody>
+          <a:bodyPr/>
+          <a:lstStyle/>
+          <a:p>
+            <a:r>
+              <a:rPr lang="en-US"/>
+              <a:t>U.S. Environmental Protection Agency</a:t>
+            </a:r>
+          </a:p>
+        </p:txBody>
+      </p:sp>
+      <p:sp>
+        <p:nvSpPr>
+          <p:cNvPr id="2" name="Rectangle 1"/>
+          <p:cNvSpPr/>
+          <p:nvPr/>
+        </p:nvSpPr>
+        <p:spPr bwMode="auto">
+          <a:xfrm>
+            <a:off x="0" y="762000"/>
+            <a:ext cx="9144000" cy="5334000"/>
+          </a:xfrm>
+          <a:prstGeom prst="rect">
+            <a:avLst/>
+          </a:prstGeom>
+          <a:solidFill>
+            <a:schemeClr val="tx1"/>
+          </a:solidFill>
+          <a:ln w="9525" cap="flat" cmpd="sng" algn="ctr">
+            <a:solidFill>
+              <a:schemeClr val="tx1"/>
+            </a:solidFill>
+            <a:prstDash val="solid"/>
+            <a:round/>
+            <a:headEnd type="none" w="med" len="med"/>
+            <a:tailEnd type="none" w="med" len="med"/>
+          </a:ln>
+          <a:effectLst/>
+          <a:extLst/>
+        </p:spPr>
+        <p:txBody>
+          <a:bodyPr vert="horz" wrap="square" lIns="91440" tIns="45720" rIns="91440" bIns="45720" numCol="1" rtlCol="0" anchor="t" anchorCtr="0" compatLnSpc="1">
+            <a:prstTxWarp prst="textNoShape">
+              <a:avLst/>
+            </a:prstTxWarp>
+          </a:bodyPr>
+          <a:lstStyle/>
+          <a:p>
+            <a:pPr marL="0" marR="0" indent="0" algn="l" defTabSz="914400" rtl="0" eaLnBrk="0" fontAlgn="base" latinLnBrk="0" hangingPunct="0">
+              <a:lnSpc>
+                <a:spcPct val="100000"/>
+              </a:lnSpc>
+              <a:spcBef>
+                <a:spcPct val="0"/>
+              </a:spcBef>
+              <a:spcAft>
+                <a:spcPct val="0"/>
+              </a:spcAft>
+              <a:buClrTx/>
+              <a:buSzTx/>
+              <a:buFontTx/>
+              <a:buNone/>
+              <a:tabLst/>
+            </a:pPr>
+            <a:endParaRPr kumimoji="0" lang="en-US" sz="2400" b="0" i="0" u="none" strike="noStrike" cap="none" normalizeH="0" baseline="0">
+              <a:ln>
+                <a:noFill/>
+              </a:ln>
+              <a:solidFill>
+                <a:schemeClr val="tx1"/>
+              </a:solidFill>
+              <a:effectLst/>
+              <a:latin typeface="Arial" charset="0"/>
+              <a:ea typeface="ＭＳ Ｐゴシック" pitchFamily="1" charset="-128"/>
+            </a:endParaRPr>
+          </a:p>
+        </p:txBody>
+      </p:sp>
+      <p:pic>
+        <p:nvPicPr>
+          <p:cNvPr id="8" name="Content Placeholder 3" descr="Screen Clipping"/>
+          <p:cNvPicPr>
+            <a:picLocks noChangeAspect="1"/>
+          </p:cNvPicPr>
+          <p:nvPr/>
+        </p:nvPicPr>
+        <p:blipFill>
+          <a:blip r:embed="rId3">
+            <a:extLst>
+              <a:ext uri="{28A0092B-C50C-407E-A947-70E740481C1C}">
+                <a14:useLocalDpi xmlns:a14="http://schemas.microsoft.com/office/drawing/2010/main" val="0"/>
+              </a:ext>
+            </a:extLst>
+          </a:blip>
+          <a:stretch>
+            <a:fillRect/>
+          </a:stretch>
+        </p:blipFill>
+        <p:spPr>
+          <a:xfrm>
             <a:off x="3762086" y="825500"/>
             <a:ext cx="5381914" cy="5207000"/>
           </a:xfrm>
@@ -3505,10 +5747,1417 @@
           </a:prstGeom>
         </p:spPr>
       </p:pic>
+      <p:pic>
+        <p:nvPicPr>
+          <p:cNvPr id="9" name="Picture 8" descr="Screen Clipping"/>
+          <p:cNvPicPr>
+            <a:picLocks noChangeAspect="1"/>
+          </p:cNvPicPr>
+          <p:nvPr/>
+        </p:nvPicPr>
+        <p:blipFill>
+          <a:blip r:embed="rId4">
+            <a:extLst>
+              <a:ext uri="{28A0092B-C50C-407E-A947-70E740481C1C}">
+                <a14:useLocalDpi xmlns:a14="http://schemas.microsoft.com/office/drawing/2010/main" val="0"/>
+              </a:ext>
+            </a:extLst>
+          </a:blip>
+          <a:stretch>
+            <a:fillRect/>
+          </a:stretch>
+        </p:blipFill>
+        <p:spPr>
+          <a:xfrm>
+            <a:off x="3723262" y="914400"/>
+            <a:ext cx="5344537" cy="5136847"/>
+          </a:xfrm>
+          <a:prstGeom prst="rect">
+            <a:avLst/>
+          </a:prstGeom>
+        </p:spPr>
+      </p:pic>
+      <p:sp>
+        <p:nvSpPr>
+          <p:cNvPr id="13" name="Title 1"/>
+          <p:cNvSpPr txBox="1">
+            <a:spLocks/>
+          </p:cNvSpPr>
+          <p:nvPr/>
+        </p:nvSpPr>
+        <p:spPr>
+          <a:xfrm>
+            <a:off x="560961" y="1119113"/>
+            <a:ext cx="3124200" cy="568399"/>
+          </a:xfrm>
+          <a:prstGeom prst="rect">
+            <a:avLst/>
+          </a:prstGeom>
+        </p:spPr>
+        <p:txBody>
+          <a:bodyPr vert="horz" lIns="91440" tIns="45720" rIns="91440" bIns="45720" rtlCol="0" anchor="b">
+            <a:noAutofit/>
+          </a:bodyPr>
+          <a:lstStyle>
+            <a:lvl1pPr algn="l" defTabSz="914400" rtl="0" eaLnBrk="1" latinLnBrk="0" hangingPunct="1">
+              <a:lnSpc>
+                <a:spcPct val="90000"/>
+              </a:lnSpc>
+              <a:spcBef>
+                <a:spcPct val="0"/>
+              </a:spcBef>
+              <a:buNone/>
+              <a:defRPr sz="3200" kern="1200">
+                <a:solidFill>
+                  <a:schemeClr val="tx1"/>
+                </a:solidFill>
+                <a:latin typeface="+mj-lt"/>
+                <a:ea typeface="+mj-ea"/>
+                <a:cs typeface="+mj-cs"/>
+              </a:defRPr>
+            </a:lvl1pPr>
+          </a:lstStyle>
+          <a:p>
+            <a:pPr marL="0" marR="0" lvl="0" indent="0" algn="l" defTabSz="914400" rtl="0" eaLnBrk="1" fontAlgn="auto" latinLnBrk="0" hangingPunct="1">
+              <a:lnSpc>
+                <a:spcPct val="90000"/>
+              </a:lnSpc>
+              <a:spcBef>
+                <a:spcPct val="0"/>
+              </a:spcBef>
+              <a:spcAft>
+                <a:spcPts val="0"/>
+              </a:spcAft>
+              <a:buClrTx/>
+              <a:buSzTx/>
+              <a:buFontTx/>
+              <a:buNone/>
+              <a:tabLst/>
+              <a:defRPr/>
+            </a:pPr>
+            <a:r>
+              <a:rPr kumimoji="0" lang="en-US" sz="2400" b="0" i="0" u="none" strike="noStrike" kern="1200" cap="none" spc="0" normalizeH="0" baseline="0" noProof="0" dirty="0">
+                <a:ln>
+                  <a:noFill/>
+                </a:ln>
+                <a:solidFill>
+                  <a:srgbClr val="026CB6"/>
+                </a:solidFill>
+                <a:effectLst/>
+                <a:uLnTx/>
+                <a:uFillTx/>
+                <a:latin typeface="Arial" panose="020B0604020202020204" pitchFamily="34" charset="0"/>
+                <a:cs typeface="Arial" panose="020B0604020202020204" pitchFamily="34" charset="0"/>
+              </a:rPr>
+              <a:t>The Complete AOPwiki Network</a:t>
+            </a:r>
+          </a:p>
+        </p:txBody>
+      </p:sp>
+      <p:pic>
+        <p:nvPicPr>
+          <p:cNvPr id="14" name="Picture 13" descr="Screen Clipping"/>
+          <p:cNvPicPr>
+            <a:picLocks noChangeAspect="1"/>
+          </p:cNvPicPr>
+          <p:nvPr/>
+        </p:nvPicPr>
+        <p:blipFill>
+          <a:blip r:embed="rId5">
+            <a:extLst>
+              <a:ext uri="{28A0092B-C50C-407E-A947-70E740481C1C}">
+                <a14:useLocalDpi xmlns:a14="http://schemas.microsoft.com/office/drawing/2010/main" val="0"/>
+              </a:ext>
+            </a:extLst>
+          </a:blip>
+          <a:stretch>
+            <a:fillRect/>
+          </a:stretch>
+        </p:blipFill>
+        <p:spPr>
+          <a:xfrm>
+            <a:off x="273774" y="2994127"/>
+            <a:ext cx="3373287" cy="3101873"/>
+          </a:xfrm>
+          <a:prstGeom prst="rect">
+            <a:avLst/>
+          </a:prstGeom>
+        </p:spPr>
+      </p:pic>
+      <p:sp>
+        <p:nvSpPr>
+          <p:cNvPr id="15" name="Text Placeholder 15"/>
+          <p:cNvSpPr txBox="1">
+            <a:spLocks/>
+          </p:cNvSpPr>
+          <p:nvPr/>
+        </p:nvSpPr>
+        <p:spPr>
+          <a:xfrm>
+            <a:off x="609599" y="1752600"/>
+            <a:ext cx="3349374" cy="3082993"/>
+          </a:xfrm>
+          <a:prstGeom prst="rect">
+            <a:avLst/>
+          </a:prstGeom>
+        </p:spPr>
+        <p:txBody>
+          <a:bodyPr vert="horz" lIns="91440" tIns="45720" rIns="91440" bIns="45720" rtlCol="0">
+            <a:normAutofit/>
+          </a:bodyPr>
+          <a:lstStyle>
+            <a:lvl1pPr marL="0" indent="0" algn="l" defTabSz="914400" rtl="0" eaLnBrk="1" latinLnBrk="0" hangingPunct="1">
+              <a:lnSpc>
+                <a:spcPct val="90000"/>
+              </a:lnSpc>
+              <a:spcBef>
+                <a:spcPts val="1000"/>
+              </a:spcBef>
+              <a:buFont typeface="Arial" panose="020B0604020202020204" pitchFamily="34" charset="0"/>
+              <a:buNone/>
+              <a:defRPr sz="1600" kern="1200">
+                <a:solidFill>
+                  <a:schemeClr val="tx1"/>
+                </a:solidFill>
+                <a:latin typeface="+mn-lt"/>
+                <a:ea typeface="+mn-ea"/>
+                <a:cs typeface="+mn-cs"/>
+              </a:defRPr>
+            </a:lvl1pPr>
+            <a:lvl2pPr marL="457200" indent="0" algn="l" defTabSz="914400" rtl="0" eaLnBrk="1" latinLnBrk="0" hangingPunct="1">
+              <a:lnSpc>
+                <a:spcPct val="90000"/>
+              </a:lnSpc>
+              <a:spcBef>
+                <a:spcPts val="500"/>
+              </a:spcBef>
+              <a:buFont typeface="Arial" panose="020B0604020202020204" pitchFamily="34" charset="0"/>
+              <a:buNone/>
+              <a:defRPr sz="1400" kern="1200">
+                <a:solidFill>
+                  <a:schemeClr val="tx1"/>
+                </a:solidFill>
+                <a:latin typeface="+mn-lt"/>
+                <a:ea typeface="+mn-ea"/>
+                <a:cs typeface="+mn-cs"/>
+              </a:defRPr>
+            </a:lvl2pPr>
+            <a:lvl3pPr marL="914400" indent="0" algn="l" defTabSz="914400" rtl="0" eaLnBrk="1" latinLnBrk="0" hangingPunct="1">
+              <a:lnSpc>
+                <a:spcPct val="90000"/>
+              </a:lnSpc>
+              <a:spcBef>
+                <a:spcPts val="500"/>
+              </a:spcBef>
+              <a:buFont typeface="Arial" panose="020B0604020202020204" pitchFamily="34" charset="0"/>
+              <a:buNone/>
+              <a:defRPr sz="1200" kern="1200">
+                <a:solidFill>
+                  <a:schemeClr val="tx1"/>
+                </a:solidFill>
+                <a:latin typeface="+mn-lt"/>
+                <a:ea typeface="+mn-ea"/>
+                <a:cs typeface="+mn-cs"/>
+              </a:defRPr>
+            </a:lvl3pPr>
+            <a:lvl4pPr marL="1371600" indent="0" algn="l" defTabSz="914400" rtl="0" eaLnBrk="1" latinLnBrk="0" hangingPunct="1">
+              <a:lnSpc>
+                <a:spcPct val="90000"/>
+              </a:lnSpc>
+              <a:spcBef>
+                <a:spcPts val="500"/>
+              </a:spcBef>
+              <a:buFont typeface="Arial" panose="020B0604020202020204" pitchFamily="34" charset="0"/>
+              <a:buNone/>
+              <a:defRPr sz="1000" kern="1200">
+                <a:solidFill>
+                  <a:schemeClr val="tx1"/>
+                </a:solidFill>
+                <a:latin typeface="+mn-lt"/>
+                <a:ea typeface="+mn-ea"/>
+                <a:cs typeface="+mn-cs"/>
+              </a:defRPr>
+            </a:lvl4pPr>
+            <a:lvl5pPr marL="1828800" indent="0" algn="l" defTabSz="914400" rtl="0" eaLnBrk="1" latinLnBrk="0" hangingPunct="1">
+              <a:lnSpc>
+                <a:spcPct val="90000"/>
+              </a:lnSpc>
+              <a:spcBef>
+                <a:spcPts val="500"/>
+              </a:spcBef>
+              <a:buFont typeface="Arial" panose="020B0604020202020204" pitchFamily="34" charset="0"/>
+              <a:buNone/>
+              <a:defRPr sz="1000" kern="1200">
+                <a:solidFill>
+                  <a:schemeClr val="tx1"/>
+                </a:solidFill>
+                <a:latin typeface="+mn-lt"/>
+                <a:ea typeface="+mn-ea"/>
+                <a:cs typeface="+mn-cs"/>
+              </a:defRPr>
+            </a:lvl5pPr>
+            <a:lvl6pPr marL="2286000" indent="0" algn="l" defTabSz="914400" rtl="0" eaLnBrk="1" latinLnBrk="0" hangingPunct="1">
+              <a:lnSpc>
+                <a:spcPct val="90000"/>
+              </a:lnSpc>
+              <a:spcBef>
+                <a:spcPts val="500"/>
+              </a:spcBef>
+              <a:buFont typeface="Arial" panose="020B0604020202020204" pitchFamily="34" charset="0"/>
+              <a:buNone/>
+              <a:defRPr sz="1000" kern="1200">
+                <a:solidFill>
+                  <a:schemeClr val="tx1"/>
+                </a:solidFill>
+                <a:latin typeface="+mn-lt"/>
+                <a:ea typeface="+mn-ea"/>
+                <a:cs typeface="+mn-cs"/>
+              </a:defRPr>
+            </a:lvl6pPr>
+            <a:lvl7pPr marL="2743200" indent="0" algn="l" defTabSz="914400" rtl="0" eaLnBrk="1" latinLnBrk="0" hangingPunct="1">
+              <a:lnSpc>
+                <a:spcPct val="90000"/>
+              </a:lnSpc>
+              <a:spcBef>
+                <a:spcPts val="500"/>
+              </a:spcBef>
+              <a:buFont typeface="Arial" panose="020B0604020202020204" pitchFamily="34" charset="0"/>
+              <a:buNone/>
+              <a:defRPr sz="1000" kern="1200">
+                <a:solidFill>
+                  <a:schemeClr val="tx1"/>
+                </a:solidFill>
+                <a:latin typeface="+mn-lt"/>
+                <a:ea typeface="+mn-ea"/>
+                <a:cs typeface="+mn-cs"/>
+              </a:defRPr>
+            </a:lvl7pPr>
+            <a:lvl8pPr marL="3200400" indent="0" algn="l" defTabSz="914400" rtl="0" eaLnBrk="1" latinLnBrk="0" hangingPunct="1">
+              <a:lnSpc>
+                <a:spcPct val="90000"/>
+              </a:lnSpc>
+              <a:spcBef>
+                <a:spcPts val="500"/>
+              </a:spcBef>
+              <a:buFont typeface="Arial" panose="020B0604020202020204" pitchFamily="34" charset="0"/>
+              <a:buNone/>
+              <a:defRPr sz="1000" kern="1200">
+                <a:solidFill>
+                  <a:schemeClr val="tx1"/>
+                </a:solidFill>
+                <a:latin typeface="+mn-lt"/>
+                <a:ea typeface="+mn-ea"/>
+                <a:cs typeface="+mn-cs"/>
+              </a:defRPr>
+            </a:lvl8pPr>
+            <a:lvl9pPr marL="3657600" indent="0" algn="l" defTabSz="914400" rtl="0" eaLnBrk="1" latinLnBrk="0" hangingPunct="1">
+              <a:lnSpc>
+                <a:spcPct val="90000"/>
+              </a:lnSpc>
+              <a:spcBef>
+                <a:spcPts val="500"/>
+              </a:spcBef>
+              <a:buFont typeface="Arial" panose="020B0604020202020204" pitchFamily="34" charset="0"/>
+              <a:buNone/>
+              <a:defRPr sz="1000" kern="1200">
+                <a:solidFill>
+                  <a:schemeClr val="tx1"/>
+                </a:solidFill>
+                <a:latin typeface="+mn-lt"/>
+                <a:ea typeface="+mn-ea"/>
+                <a:cs typeface="+mn-cs"/>
+              </a:defRPr>
+            </a:lvl9pPr>
+          </a:lstStyle>
+          <a:p>
+            <a:pPr marL="0" marR="0" lvl="0" indent="0" algn="l" defTabSz="914400" rtl="0" eaLnBrk="1" fontAlgn="auto" latinLnBrk="0" hangingPunct="1">
+              <a:lnSpc>
+                <a:spcPct val="90000"/>
+              </a:lnSpc>
+              <a:spcBef>
+                <a:spcPts val="1000"/>
+              </a:spcBef>
+              <a:spcAft>
+                <a:spcPts val="0"/>
+              </a:spcAft>
+              <a:buClrTx/>
+              <a:buSzTx/>
+              <a:buFont typeface="Arial" panose="020B0604020202020204" pitchFamily="34" charset="0"/>
+              <a:buNone/>
+              <a:tabLst/>
+              <a:defRPr/>
+            </a:pPr>
+            <a:r>
+              <a:rPr kumimoji="0" lang="en-US" sz="1200" b="0" i="0" u="none" strike="noStrike" kern="1200" cap="none" spc="0" normalizeH="0" baseline="0" noProof="0" dirty="0">
+                <a:ln>
+                  <a:noFill/>
+                </a:ln>
+                <a:solidFill>
+                  <a:sysClr val="window" lastClr="FFFFFF"/>
+                </a:solidFill>
+                <a:effectLst/>
+                <a:uLnTx/>
+                <a:uFillTx/>
+                <a:latin typeface="Calibri" panose="020F0502020204030204"/>
+                <a:ea typeface="+mn-ea"/>
+                <a:cs typeface="+mn-cs"/>
+              </a:rPr>
+              <a:t>The AOP wiki has:</a:t>
+            </a:r>
+          </a:p>
+          <a:p>
+            <a:pPr marL="285750" marR="0" lvl="0" indent="-285750" algn="l" defTabSz="914400" rtl="0" eaLnBrk="1" fontAlgn="auto" latinLnBrk="0" hangingPunct="1">
+              <a:lnSpc>
+                <a:spcPct val="90000"/>
+              </a:lnSpc>
+              <a:spcBef>
+                <a:spcPts val="1000"/>
+              </a:spcBef>
+              <a:spcAft>
+                <a:spcPts val="0"/>
+              </a:spcAft>
+              <a:buClrTx/>
+              <a:buSzTx/>
+              <a:buFont typeface="Arial" panose="020B0604020202020204" pitchFamily="34" charset="0"/>
+              <a:buChar char="•"/>
+              <a:tabLst/>
+              <a:defRPr/>
+            </a:pPr>
+            <a:r>
+              <a:rPr kumimoji="0" lang="en-US" sz="1200" b="0" i="0" u="none" strike="noStrike" kern="1200" cap="none" spc="0" normalizeH="0" baseline="0" noProof="0" dirty="0">
+                <a:ln>
+                  <a:noFill/>
+                </a:ln>
+                <a:solidFill>
+                  <a:sysClr val="window" lastClr="FFFFFF"/>
+                </a:solidFill>
+                <a:effectLst/>
+                <a:uLnTx/>
+                <a:uFillTx/>
+                <a:latin typeface="Calibri" panose="020F0502020204030204"/>
+                <a:ea typeface="+mn-ea"/>
+                <a:cs typeface="+mn-cs"/>
+              </a:rPr>
+              <a:t>131 different AOPs </a:t>
+            </a:r>
+          </a:p>
+          <a:p>
+            <a:pPr marL="285750" marR="0" lvl="0" indent="-285750" algn="l" defTabSz="914400" rtl="0" eaLnBrk="1" fontAlgn="auto" latinLnBrk="0" hangingPunct="1">
+              <a:lnSpc>
+                <a:spcPct val="90000"/>
+              </a:lnSpc>
+              <a:spcBef>
+                <a:spcPts val="1000"/>
+              </a:spcBef>
+              <a:spcAft>
+                <a:spcPts val="0"/>
+              </a:spcAft>
+              <a:buClrTx/>
+              <a:buSzTx/>
+              <a:buFont typeface="Arial" panose="020B0604020202020204" pitchFamily="34" charset="0"/>
+              <a:buChar char="•"/>
+              <a:tabLst/>
+              <a:defRPr/>
+            </a:pPr>
+            <a:r>
+              <a:rPr kumimoji="0" lang="en-US" sz="1200" b="0" i="0" u="none" strike="noStrike" kern="1200" cap="none" spc="0" normalizeH="0" baseline="0" noProof="0" dirty="0">
+                <a:ln>
+                  <a:noFill/>
+                </a:ln>
+                <a:solidFill>
+                  <a:sysClr val="window" lastClr="FFFFFF"/>
+                </a:solidFill>
+                <a:effectLst/>
+                <a:uLnTx/>
+                <a:uFillTx/>
+                <a:latin typeface="Calibri" panose="020F0502020204030204"/>
+                <a:ea typeface="+mn-ea"/>
+                <a:cs typeface="+mn-cs"/>
+              </a:rPr>
+              <a:t>1058 key event relationships</a:t>
+            </a:r>
+          </a:p>
+          <a:p>
+            <a:pPr marL="285750" marR="0" lvl="0" indent="-285750" algn="l" defTabSz="914400" rtl="0" eaLnBrk="1" fontAlgn="auto" latinLnBrk="0" hangingPunct="1">
+              <a:lnSpc>
+                <a:spcPct val="90000"/>
+              </a:lnSpc>
+              <a:spcBef>
+                <a:spcPts val="1000"/>
+              </a:spcBef>
+              <a:spcAft>
+                <a:spcPts val="0"/>
+              </a:spcAft>
+              <a:buClrTx/>
+              <a:buSzTx/>
+              <a:buFont typeface="Arial" panose="020B0604020202020204" pitchFamily="34" charset="0"/>
+              <a:buChar char="•"/>
+              <a:tabLst/>
+              <a:defRPr/>
+            </a:pPr>
+            <a:r>
+              <a:rPr kumimoji="0" lang="en-US" sz="1200" b="0" i="0" u="none" strike="noStrike" kern="1200" cap="none" spc="0" normalizeH="0" baseline="0" noProof="0" dirty="0">
+                <a:ln>
+                  <a:noFill/>
+                </a:ln>
+                <a:solidFill>
+                  <a:sysClr val="window" lastClr="FFFFFF"/>
+                </a:solidFill>
+                <a:effectLst/>
+                <a:uLnTx/>
+                <a:uFillTx/>
+                <a:latin typeface="Calibri" panose="020F0502020204030204"/>
+                <a:ea typeface="+mn-ea"/>
+                <a:cs typeface="+mn-cs"/>
+              </a:rPr>
+              <a:t>750 unique key events</a:t>
+            </a:r>
+          </a:p>
+          <a:p>
+            <a:pPr marL="285750" marR="0" lvl="0" indent="-285750" algn="l" defTabSz="914400" rtl="0" eaLnBrk="1" fontAlgn="auto" latinLnBrk="0" hangingPunct="1">
+              <a:lnSpc>
+                <a:spcPct val="90000"/>
+              </a:lnSpc>
+              <a:spcBef>
+                <a:spcPts val="1000"/>
+              </a:spcBef>
+              <a:spcAft>
+                <a:spcPts val="0"/>
+              </a:spcAft>
+              <a:buClrTx/>
+              <a:buSzTx/>
+              <a:buFont typeface="Arial" panose="020B0604020202020204" pitchFamily="34" charset="0"/>
+              <a:buChar char="•"/>
+              <a:tabLst/>
+              <a:defRPr/>
+            </a:pPr>
+            <a:r>
+              <a:rPr kumimoji="0" lang="en-US" sz="1200" b="0" i="0" u="none" strike="noStrike" kern="1200" cap="none" spc="0" normalizeH="0" baseline="0" noProof="0" dirty="0">
+                <a:ln>
+                  <a:noFill/>
+                </a:ln>
+                <a:solidFill>
+                  <a:sysClr val="window" lastClr="FFFFFF"/>
+                </a:solidFill>
+                <a:effectLst/>
+                <a:uLnTx/>
+                <a:uFillTx/>
+                <a:latin typeface="Calibri" panose="020F0502020204030204"/>
+                <a:ea typeface="+mn-ea"/>
+                <a:cs typeface="+mn-cs"/>
+              </a:rPr>
+              <a:t>Mean number of KEs per AOP is 4.8</a:t>
+            </a:r>
+          </a:p>
+        </p:txBody>
+      </p:sp>
     </p:spTree>
     <p:extLst>
       <p:ext uri="{BB962C8B-B14F-4D97-AF65-F5344CB8AC3E}">
         <p14:creationId xmlns:p14="http://schemas.microsoft.com/office/powerpoint/2010/main" val="501689005"/>
+      </p:ext>
+    </p:extLst>
+  </p:cSld>
+  <p:clrMapOvr>
+    <a:masterClrMapping/>
+  </p:clrMapOvr>
+</p:sld>
+</file>
+
+<file path=ppt/slides/slide8.xml><?xml version="1.0" encoding="utf-8"?>
+<p:sld xmlns:a="http://schemas.openxmlformats.org/drawingml/2006/main" xmlns:r="http://schemas.openxmlformats.org/officeDocument/2006/relationships" xmlns:p="http://schemas.openxmlformats.org/presentationml/2006/main">
+  <p:cSld>
+    <p:spTree>
+      <p:nvGrpSpPr>
+        <p:cNvPr id="1" name=""/>
+        <p:cNvGrpSpPr/>
+        <p:nvPr/>
+      </p:nvGrpSpPr>
+      <p:grpSpPr>
+        <a:xfrm>
+          <a:off x="0" y="0"/>
+          <a:ext cx="0" cy="0"/>
+          <a:chOff x="0" y="0"/>
+          <a:chExt cx="0" cy="0"/>
+        </a:xfrm>
+      </p:grpSpPr>
+      <p:sp>
+        <p:nvSpPr>
+          <p:cNvPr id="18434" name="Rectangle 2"/>
+          <p:cNvSpPr>
+            <a:spLocks noGrp="1" noChangeArrowheads="1"/>
+          </p:cNvSpPr>
+          <p:nvPr>
+            <p:ph type="title"/>
+          </p:nvPr>
+        </p:nvSpPr>
+        <p:spPr>
+          <a:xfrm>
+            <a:off x="685800" y="1957388"/>
+            <a:ext cx="7772400" cy="579437"/>
+          </a:xfrm>
+        </p:spPr>
+        <p:txBody>
+          <a:bodyPr anchor="t"/>
+          <a:lstStyle/>
+          <a:p>
+            <a:pPr eaLnBrk="1" hangingPunct="1"/>
+            <a:endParaRPr lang="en-US" dirty="0"/>
+          </a:p>
+        </p:txBody>
+      </p:sp>
+      <p:sp>
+        <p:nvSpPr>
+          <p:cNvPr id="18435" name="Rectangle 3"/>
+          <p:cNvSpPr>
+            <a:spLocks noGrp="1" noChangeArrowheads="1"/>
+          </p:cNvSpPr>
+          <p:nvPr>
+            <p:ph type="body" idx="1"/>
+          </p:nvPr>
+        </p:nvSpPr>
+        <p:spPr/>
+        <p:txBody>
+          <a:bodyPr/>
+          <a:lstStyle/>
+          <a:p>
+            <a:pPr eaLnBrk="1" hangingPunct="1"/>
+            <a:endParaRPr lang="en-US"/>
+          </a:p>
+        </p:txBody>
+      </p:sp>
+      <p:sp>
+        <p:nvSpPr>
+          <p:cNvPr id="18436" name="Date Placeholder 7"/>
+          <p:cNvSpPr>
+            <a:spLocks noGrp="1"/>
+          </p:cNvSpPr>
+          <p:nvPr>
+            <p:ph type="dt" sz="quarter" idx="10"/>
+          </p:nvPr>
+        </p:nvSpPr>
+        <p:spPr>
+          <a:noFill/>
+        </p:spPr>
+        <p:txBody>
+          <a:bodyPr/>
+          <a:lstStyle/>
+          <a:p>
+            <a:fld id="{75FB81E4-ADE5-4B0D-9013-84BBB8D96257}" type="datetime1">
+              <a:rPr lang="en-US" smtClean="0"/>
+              <a:pPr/>
+              <a:t>5/25/2017</a:t>
+            </a:fld>
+            <a:endParaRPr lang="en-US"/>
+          </a:p>
+        </p:txBody>
+      </p:sp>
+      <p:sp>
+        <p:nvSpPr>
+          <p:cNvPr id="18437" name="Slide Number Placeholder 8"/>
+          <p:cNvSpPr>
+            <a:spLocks noGrp="1"/>
+          </p:cNvSpPr>
+          <p:nvPr>
+            <p:ph type="sldNum" sz="quarter" idx="12"/>
+          </p:nvPr>
+        </p:nvSpPr>
+        <p:spPr>
+          <a:noFill/>
+        </p:spPr>
+        <p:txBody>
+          <a:bodyPr/>
+          <a:lstStyle/>
+          <a:p>
+            <a:fld id="{CE64B86D-6B5D-43D5-BC3D-D0392806BE7A}" type="slidenum">
+              <a:rPr lang="en-US" smtClean="0"/>
+              <a:pPr/>
+              <a:t>7</a:t>
+            </a:fld>
+            <a:endParaRPr lang="en-US"/>
+          </a:p>
+        </p:txBody>
+      </p:sp>
+      <p:sp>
+        <p:nvSpPr>
+          <p:cNvPr id="18438" name="Footer Placeholder 9"/>
+          <p:cNvSpPr>
+            <a:spLocks noGrp="1"/>
+          </p:cNvSpPr>
+          <p:nvPr>
+            <p:ph type="ftr" sz="quarter" idx="11"/>
+          </p:nvPr>
+        </p:nvSpPr>
+        <p:spPr>
+          <a:noFill/>
+        </p:spPr>
+        <p:txBody>
+          <a:bodyPr/>
+          <a:lstStyle/>
+          <a:p>
+            <a:r>
+              <a:rPr lang="en-US"/>
+              <a:t>U.S. Environmental Protection Agency</a:t>
+            </a:r>
+          </a:p>
+        </p:txBody>
+      </p:sp>
+      <p:sp>
+        <p:nvSpPr>
+          <p:cNvPr id="2" name="Rectangle 1"/>
+          <p:cNvSpPr/>
+          <p:nvPr/>
+        </p:nvSpPr>
+        <p:spPr bwMode="auto">
+          <a:xfrm>
+            <a:off x="0" y="762000"/>
+            <a:ext cx="9144000" cy="5334000"/>
+          </a:xfrm>
+          <a:prstGeom prst="rect">
+            <a:avLst/>
+          </a:prstGeom>
+          <a:solidFill>
+            <a:schemeClr val="tx1"/>
+          </a:solidFill>
+          <a:ln w="9525" cap="flat" cmpd="sng" algn="ctr">
+            <a:solidFill>
+              <a:schemeClr val="tx1"/>
+            </a:solidFill>
+            <a:prstDash val="solid"/>
+            <a:round/>
+            <a:headEnd type="none" w="med" len="med"/>
+            <a:tailEnd type="none" w="med" len="med"/>
+          </a:ln>
+          <a:effectLst/>
+          <a:extLst/>
+        </p:spPr>
+        <p:txBody>
+          <a:bodyPr vert="horz" wrap="square" lIns="91440" tIns="45720" rIns="91440" bIns="45720" numCol="1" rtlCol="0" anchor="t" anchorCtr="0" compatLnSpc="1">
+            <a:prstTxWarp prst="textNoShape">
+              <a:avLst/>
+            </a:prstTxWarp>
+          </a:bodyPr>
+          <a:lstStyle/>
+          <a:p>
+            <a:pPr algn="ctr"/>
+            <a:r>
+              <a:rPr lang="en-US" sz="2000" dirty="0">
+                <a:solidFill>
+                  <a:schemeClr val="bg1"/>
+                </a:solidFill>
+              </a:rPr>
+              <a:t>Component analyses determine connectivity in the network. </a:t>
+            </a:r>
+            <a:br>
+              <a:rPr lang="en-US" sz="2000" dirty="0">
+                <a:solidFill>
+                  <a:schemeClr val="bg1"/>
+                </a:solidFill>
+              </a:rPr>
+            </a:br>
+            <a:br>
+              <a:rPr lang="en-US" sz="2000" dirty="0">
+                <a:solidFill>
+                  <a:schemeClr val="bg1"/>
+                </a:solidFill>
+              </a:rPr>
+            </a:br>
+            <a:endParaRPr kumimoji="0" lang="en-US" sz="2000" b="0" i="0" u="none" strike="noStrike" cap="none" normalizeH="0" baseline="0" dirty="0">
+              <a:ln>
+                <a:noFill/>
+              </a:ln>
+              <a:solidFill>
+                <a:schemeClr val="tx1"/>
+              </a:solidFill>
+              <a:effectLst/>
+              <a:latin typeface="Arial" charset="0"/>
+              <a:ea typeface="ＭＳ Ｐゴシック" pitchFamily="1" charset="-128"/>
+            </a:endParaRPr>
+          </a:p>
+        </p:txBody>
+      </p:sp>
+      <p:pic>
+        <p:nvPicPr>
+          <p:cNvPr id="16" name="Content Placeholder 4" descr="Screen Clipping"/>
+          <p:cNvPicPr>
+            <a:picLocks noChangeAspect="1"/>
+          </p:cNvPicPr>
+          <p:nvPr/>
+        </p:nvPicPr>
+        <p:blipFill>
+          <a:blip r:embed="rId3" cstate="print">
+            <a:extLst>
+              <a:ext uri="{28A0092B-C50C-407E-A947-70E740481C1C}">
+                <a14:useLocalDpi xmlns:a14="http://schemas.microsoft.com/office/drawing/2010/main" val="0"/>
+              </a:ext>
+            </a:extLst>
+          </a:blip>
+          <a:stretch>
+            <a:fillRect/>
+          </a:stretch>
+        </p:blipFill>
+        <p:spPr>
+          <a:xfrm>
+            <a:off x="572917" y="1296766"/>
+            <a:ext cx="3276600" cy="3288997"/>
+          </a:xfrm>
+          <a:prstGeom prst="rect">
+            <a:avLst/>
+          </a:prstGeom>
+        </p:spPr>
+      </p:pic>
+      <p:sp>
+        <p:nvSpPr>
+          <p:cNvPr id="19" name="Title 1"/>
+          <p:cNvSpPr txBox="1">
+            <a:spLocks/>
+          </p:cNvSpPr>
+          <p:nvPr/>
+        </p:nvSpPr>
+        <p:spPr>
+          <a:xfrm>
+            <a:off x="1683940" y="228600"/>
+            <a:ext cx="5776119" cy="457200"/>
+          </a:xfrm>
+          <a:prstGeom prst="rect">
+            <a:avLst/>
+          </a:prstGeom>
+        </p:spPr>
+        <p:txBody>
+          <a:bodyPr vert="horz" lIns="91440" tIns="45720" rIns="91440" bIns="45720" rtlCol="0" anchor="b">
+            <a:noAutofit/>
+          </a:bodyPr>
+          <a:lstStyle>
+            <a:lvl1pPr algn="l" defTabSz="914400" rtl="0" eaLnBrk="1" latinLnBrk="0" hangingPunct="1">
+              <a:lnSpc>
+                <a:spcPct val="90000"/>
+              </a:lnSpc>
+              <a:spcBef>
+                <a:spcPct val="0"/>
+              </a:spcBef>
+              <a:buNone/>
+              <a:defRPr sz="3200" kern="1200">
+                <a:solidFill>
+                  <a:schemeClr val="tx1"/>
+                </a:solidFill>
+                <a:latin typeface="+mj-lt"/>
+                <a:ea typeface="+mj-ea"/>
+                <a:cs typeface="+mj-cs"/>
+              </a:defRPr>
+            </a:lvl1pPr>
+          </a:lstStyle>
+          <a:p>
+            <a:pPr marL="0" marR="0" lvl="0" indent="0" algn="ctr" defTabSz="914400" rtl="0" eaLnBrk="1" fontAlgn="auto" latinLnBrk="0" hangingPunct="1">
+              <a:lnSpc>
+                <a:spcPct val="90000"/>
+              </a:lnSpc>
+              <a:spcBef>
+                <a:spcPct val="0"/>
+              </a:spcBef>
+              <a:spcAft>
+                <a:spcPts val="0"/>
+              </a:spcAft>
+              <a:buClrTx/>
+              <a:buSzTx/>
+              <a:buFontTx/>
+              <a:buNone/>
+              <a:tabLst/>
+              <a:defRPr/>
+            </a:pPr>
+            <a:r>
+              <a:rPr lang="en-US" sz="2400" dirty="0">
+                <a:solidFill>
+                  <a:srgbClr val="026CB6"/>
+                </a:solidFill>
+                <a:latin typeface="Arial" panose="020B0604020202020204" pitchFamily="34" charset="0"/>
+                <a:cs typeface="Arial" panose="020B0604020202020204" pitchFamily="34" charset="0"/>
+              </a:rPr>
+              <a:t>Component Analyses</a:t>
+            </a:r>
+            <a:endParaRPr kumimoji="0" lang="en-US" sz="2400" b="0" i="0" u="none" strike="noStrike" kern="1200" cap="none" spc="0" normalizeH="0" baseline="0" noProof="0" dirty="0">
+              <a:ln>
+                <a:noFill/>
+              </a:ln>
+              <a:solidFill>
+                <a:srgbClr val="026CB6"/>
+              </a:solidFill>
+              <a:effectLst/>
+              <a:uLnTx/>
+              <a:uFillTx/>
+              <a:latin typeface="Arial" panose="020B0604020202020204" pitchFamily="34" charset="0"/>
+              <a:cs typeface="Arial" panose="020B0604020202020204" pitchFamily="34" charset="0"/>
+            </a:endParaRPr>
+          </a:p>
+        </p:txBody>
+      </p:sp>
+      <p:sp>
+        <p:nvSpPr>
+          <p:cNvPr id="20" name="Text Placeholder 15"/>
+          <p:cNvSpPr txBox="1">
+            <a:spLocks/>
+          </p:cNvSpPr>
+          <p:nvPr/>
+        </p:nvSpPr>
+        <p:spPr>
+          <a:xfrm>
+            <a:off x="3398195" y="1524000"/>
+            <a:ext cx="2200275" cy="3811588"/>
+          </a:xfrm>
+          <a:prstGeom prst="rect">
+            <a:avLst/>
+          </a:prstGeom>
+        </p:spPr>
+        <p:txBody>
+          <a:bodyPr vert="horz" lIns="91440" tIns="45720" rIns="91440" bIns="45720" rtlCol="0">
+            <a:normAutofit/>
+          </a:bodyPr>
+          <a:lstStyle>
+            <a:lvl1pPr marL="0" indent="0" algn="l" defTabSz="914400" rtl="0" eaLnBrk="1" latinLnBrk="0" hangingPunct="1">
+              <a:lnSpc>
+                <a:spcPct val="90000"/>
+              </a:lnSpc>
+              <a:spcBef>
+                <a:spcPts val="1000"/>
+              </a:spcBef>
+              <a:buFont typeface="Arial" panose="020B0604020202020204" pitchFamily="34" charset="0"/>
+              <a:buNone/>
+              <a:defRPr sz="1600" kern="1200">
+                <a:solidFill>
+                  <a:schemeClr val="tx1"/>
+                </a:solidFill>
+                <a:latin typeface="+mn-lt"/>
+                <a:ea typeface="+mn-ea"/>
+                <a:cs typeface="+mn-cs"/>
+              </a:defRPr>
+            </a:lvl1pPr>
+            <a:lvl2pPr marL="457200" indent="0" algn="l" defTabSz="914400" rtl="0" eaLnBrk="1" latinLnBrk="0" hangingPunct="1">
+              <a:lnSpc>
+                <a:spcPct val="90000"/>
+              </a:lnSpc>
+              <a:spcBef>
+                <a:spcPts val="500"/>
+              </a:spcBef>
+              <a:buFont typeface="Arial" panose="020B0604020202020204" pitchFamily="34" charset="0"/>
+              <a:buNone/>
+              <a:defRPr sz="1400" kern="1200">
+                <a:solidFill>
+                  <a:schemeClr val="tx1"/>
+                </a:solidFill>
+                <a:latin typeface="+mn-lt"/>
+                <a:ea typeface="+mn-ea"/>
+                <a:cs typeface="+mn-cs"/>
+              </a:defRPr>
+            </a:lvl2pPr>
+            <a:lvl3pPr marL="914400" indent="0" algn="l" defTabSz="914400" rtl="0" eaLnBrk="1" latinLnBrk="0" hangingPunct="1">
+              <a:lnSpc>
+                <a:spcPct val="90000"/>
+              </a:lnSpc>
+              <a:spcBef>
+                <a:spcPts val="500"/>
+              </a:spcBef>
+              <a:buFont typeface="Arial" panose="020B0604020202020204" pitchFamily="34" charset="0"/>
+              <a:buNone/>
+              <a:defRPr sz="1200" kern="1200">
+                <a:solidFill>
+                  <a:schemeClr val="tx1"/>
+                </a:solidFill>
+                <a:latin typeface="+mn-lt"/>
+                <a:ea typeface="+mn-ea"/>
+                <a:cs typeface="+mn-cs"/>
+              </a:defRPr>
+            </a:lvl3pPr>
+            <a:lvl4pPr marL="1371600" indent="0" algn="l" defTabSz="914400" rtl="0" eaLnBrk="1" latinLnBrk="0" hangingPunct="1">
+              <a:lnSpc>
+                <a:spcPct val="90000"/>
+              </a:lnSpc>
+              <a:spcBef>
+                <a:spcPts val="500"/>
+              </a:spcBef>
+              <a:buFont typeface="Arial" panose="020B0604020202020204" pitchFamily="34" charset="0"/>
+              <a:buNone/>
+              <a:defRPr sz="1000" kern="1200">
+                <a:solidFill>
+                  <a:schemeClr val="tx1"/>
+                </a:solidFill>
+                <a:latin typeface="+mn-lt"/>
+                <a:ea typeface="+mn-ea"/>
+                <a:cs typeface="+mn-cs"/>
+              </a:defRPr>
+            </a:lvl4pPr>
+            <a:lvl5pPr marL="1828800" indent="0" algn="l" defTabSz="914400" rtl="0" eaLnBrk="1" latinLnBrk="0" hangingPunct="1">
+              <a:lnSpc>
+                <a:spcPct val="90000"/>
+              </a:lnSpc>
+              <a:spcBef>
+                <a:spcPts val="500"/>
+              </a:spcBef>
+              <a:buFont typeface="Arial" panose="020B0604020202020204" pitchFamily="34" charset="0"/>
+              <a:buNone/>
+              <a:defRPr sz="1000" kern="1200">
+                <a:solidFill>
+                  <a:schemeClr val="tx1"/>
+                </a:solidFill>
+                <a:latin typeface="+mn-lt"/>
+                <a:ea typeface="+mn-ea"/>
+                <a:cs typeface="+mn-cs"/>
+              </a:defRPr>
+            </a:lvl5pPr>
+            <a:lvl6pPr marL="2286000" indent="0" algn="l" defTabSz="914400" rtl="0" eaLnBrk="1" latinLnBrk="0" hangingPunct="1">
+              <a:lnSpc>
+                <a:spcPct val="90000"/>
+              </a:lnSpc>
+              <a:spcBef>
+                <a:spcPts val="500"/>
+              </a:spcBef>
+              <a:buFont typeface="Arial" panose="020B0604020202020204" pitchFamily="34" charset="0"/>
+              <a:buNone/>
+              <a:defRPr sz="1000" kern="1200">
+                <a:solidFill>
+                  <a:schemeClr val="tx1"/>
+                </a:solidFill>
+                <a:latin typeface="+mn-lt"/>
+                <a:ea typeface="+mn-ea"/>
+                <a:cs typeface="+mn-cs"/>
+              </a:defRPr>
+            </a:lvl6pPr>
+            <a:lvl7pPr marL="2743200" indent="0" algn="l" defTabSz="914400" rtl="0" eaLnBrk="1" latinLnBrk="0" hangingPunct="1">
+              <a:lnSpc>
+                <a:spcPct val="90000"/>
+              </a:lnSpc>
+              <a:spcBef>
+                <a:spcPts val="500"/>
+              </a:spcBef>
+              <a:buFont typeface="Arial" panose="020B0604020202020204" pitchFamily="34" charset="0"/>
+              <a:buNone/>
+              <a:defRPr sz="1000" kern="1200">
+                <a:solidFill>
+                  <a:schemeClr val="tx1"/>
+                </a:solidFill>
+                <a:latin typeface="+mn-lt"/>
+                <a:ea typeface="+mn-ea"/>
+                <a:cs typeface="+mn-cs"/>
+              </a:defRPr>
+            </a:lvl7pPr>
+            <a:lvl8pPr marL="3200400" indent="0" algn="l" defTabSz="914400" rtl="0" eaLnBrk="1" latinLnBrk="0" hangingPunct="1">
+              <a:lnSpc>
+                <a:spcPct val="90000"/>
+              </a:lnSpc>
+              <a:spcBef>
+                <a:spcPts val="500"/>
+              </a:spcBef>
+              <a:buFont typeface="Arial" panose="020B0604020202020204" pitchFamily="34" charset="0"/>
+              <a:buNone/>
+              <a:defRPr sz="1000" kern="1200">
+                <a:solidFill>
+                  <a:schemeClr val="tx1"/>
+                </a:solidFill>
+                <a:latin typeface="+mn-lt"/>
+                <a:ea typeface="+mn-ea"/>
+                <a:cs typeface="+mn-cs"/>
+              </a:defRPr>
+            </a:lvl8pPr>
+            <a:lvl9pPr marL="3657600" indent="0" algn="l" defTabSz="914400" rtl="0" eaLnBrk="1" latinLnBrk="0" hangingPunct="1">
+              <a:lnSpc>
+                <a:spcPct val="90000"/>
+              </a:lnSpc>
+              <a:spcBef>
+                <a:spcPts val="500"/>
+              </a:spcBef>
+              <a:buFont typeface="Arial" panose="020B0604020202020204" pitchFamily="34" charset="0"/>
+              <a:buNone/>
+              <a:defRPr sz="1000" kern="1200">
+                <a:solidFill>
+                  <a:schemeClr val="tx1"/>
+                </a:solidFill>
+                <a:latin typeface="+mn-lt"/>
+                <a:ea typeface="+mn-ea"/>
+                <a:cs typeface="+mn-cs"/>
+              </a:defRPr>
+            </a:lvl9pPr>
+          </a:lstStyle>
+          <a:p>
+            <a:pPr marL="0" marR="0" lvl="0" indent="0" algn="l" defTabSz="914400" rtl="0" eaLnBrk="1" fontAlgn="auto" latinLnBrk="0" hangingPunct="1">
+              <a:lnSpc>
+                <a:spcPct val="90000"/>
+              </a:lnSpc>
+              <a:spcBef>
+                <a:spcPts val="1000"/>
+              </a:spcBef>
+              <a:spcAft>
+                <a:spcPts val="0"/>
+              </a:spcAft>
+              <a:buClrTx/>
+              <a:buSzTx/>
+              <a:buFont typeface="Arial" panose="020B0604020202020204" pitchFamily="34" charset="0"/>
+              <a:buNone/>
+              <a:tabLst/>
+              <a:defRPr/>
+            </a:pPr>
+            <a:endParaRPr kumimoji="0" lang="en-US" sz="1600" b="0" i="0" u="none" strike="noStrike" kern="1200" cap="none" spc="0" normalizeH="0" baseline="0" noProof="0" dirty="0">
+              <a:ln>
+                <a:noFill/>
+              </a:ln>
+              <a:solidFill>
+                <a:sysClr val="window" lastClr="FFFFFF"/>
+              </a:solidFill>
+              <a:effectLst/>
+              <a:uLnTx/>
+              <a:uFillTx/>
+              <a:latin typeface="Calibri" panose="020F0502020204030204"/>
+              <a:ea typeface="+mn-ea"/>
+              <a:cs typeface="+mn-cs"/>
+            </a:endParaRPr>
+          </a:p>
+          <a:p>
+            <a:pPr marL="0" marR="0" lvl="0" indent="0" algn="l" defTabSz="914400" rtl="0" eaLnBrk="1" fontAlgn="auto" latinLnBrk="0" hangingPunct="1">
+              <a:lnSpc>
+                <a:spcPct val="90000"/>
+              </a:lnSpc>
+              <a:spcBef>
+                <a:spcPts val="1000"/>
+              </a:spcBef>
+              <a:spcAft>
+                <a:spcPts val="0"/>
+              </a:spcAft>
+              <a:buClrTx/>
+              <a:buSzTx/>
+              <a:buFont typeface="Arial" panose="020B0604020202020204" pitchFamily="34" charset="0"/>
+              <a:buNone/>
+              <a:tabLst/>
+              <a:defRPr/>
+            </a:pPr>
+            <a:endParaRPr kumimoji="0" lang="en-US" sz="1600" b="0" i="0" u="none" strike="noStrike" kern="1200" cap="none" spc="0" normalizeH="0" baseline="0" noProof="0" dirty="0">
+              <a:ln>
+                <a:noFill/>
+              </a:ln>
+              <a:solidFill>
+                <a:sysClr val="window" lastClr="FFFFFF"/>
+              </a:solidFill>
+              <a:effectLst/>
+              <a:uLnTx/>
+              <a:uFillTx/>
+              <a:latin typeface="Calibri" panose="020F0502020204030204"/>
+              <a:ea typeface="+mn-ea"/>
+              <a:cs typeface="+mn-cs"/>
+            </a:endParaRPr>
+          </a:p>
+          <a:p>
+            <a:pPr marL="0" marR="0" lvl="0" indent="0" algn="l" defTabSz="914400" rtl="0" eaLnBrk="1" fontAlgn="auto" latinLnBrk="0" hangingPunct="1">
+              <a:lnSpc>
+                <a:spcPct val="90000"/>
+              </a:lnSpc>
+              <a:spcBef>
+                <a:spcPts val="1000"/>
+              </a:spcBef>
+              <a:spcAft>
+                <a:spcPts val="0"/>
+              </a:spcAft>
+              <a:buClrTx/>
+              <a:buSzTx/>
+              <a:buFont typeface="Arial" panose="020B0604020202020204" pitchFamily="34" charset="0"/>
+              <a:buNone/>
+              <a:tabLst/>
+              <a:defRPr/>
+            </a:pPr>
+            <a:endParaRPr kumimoji="0" lang="en-US" sz="1600" b="0" i="0" u="none" strike="noStrike" kern="1200" cap="none" spc="0" normalizeH="0" baseline="0" noProof="0" dirty="0">
+              <a:ln>
+                <a:noFill/>
+              </a:ln>
+              <a:solidFill>
+                <a:sysClr val="window" lastClr="FFFFFF"/>
+              </a:solidFill>
+              <a:effectLst/>
+              <a:uLnTx/>
+              <a:uFillTx/>
+              <a:latin typeface="Calibri" panose="020F0502020204030204"/>
+              <a:ea typeface="+mn-ea"/>
+              <a:cs typeface="+mn-cs"/>
+            </a:endParaRPr>
+          </a:p>
+          <a:p>
+            <a:pPr marL="0" marR="0" lvl="0" indent="0" algn="l" defTabSz="914400" rtl="0" eaLnBrk="1" fontAlgn="auto" latinLnBrk="0" hangingPunct="1">
+              <a:lnSpc>
+                <a:spcPct val="90000"/>
+              </a:lnSpc>
+              <a:spcBef>
+                <a:spcPts val="1000"/>
+              </a:spcBef>
+              <a:spcAft>
+                <a:spcPts val="0"/>
+              </a:spcAft>
+              <a:buClrTx/>
+              <a:buSzTx/>
+              <a:buFont typeface="Arial" panose="020B0604020202020204" pitchFamily="34" charset="0"/>
+              <a:buNone/>
+              <a:tabLst/>
+              <a:defRPr/>
+            </a:pPr>
+            <a:endParaRPr kumimoji="0" lang="en-US" sz="1600" b="0" i="0" u="none" strike="noStrike" kern="1200" cap="none" spc="0" normalizeH="0" baseline="0" noProof="0" dirty="0">
+              <a:ln>
+                <a:noFill/>
+              </a:ln>
+              <a:solidFill>
+                <a:sysClr val="window" lastClr="FFFFFF"/>
+              </a:solidFill>
+              <a:effectLst/>
+              <a:uLnTx/>
+              <a:uFillTx/>
+              <a:latin typeface="Calibri" panose="020F0502020204030204"/>
+              <a:ea typeface="+mn-ea"/>
+              <a:cs typeface="+mn-cs"/>
+            </a:endParaRPr>
+          </a:p>
+          <a:p>
+            <a:pPr marL="0" marR="0" lvl="0" indent="0" algn="l" defTabSz="914400" rtl="0" eaLnBrk="1" fontAlgn="auto" latinLnBrk="0" hangingPunct="1">
+              <a:lnSpc>
+                <a:spcPct val="90000"/>
+              </a:lnSpc>
+              <a:spcBef>
+                <a:spcPts val="1000"/>
+              </a:spcBef>
+              <a:spcAft>
+                <a:spcPts val="0"/>
+              </a:spcAft>
+              <a:buClrTx/>
+              <a:buSzTx/>
+              <a:buFont typeface="Arial" panose="020B0604020202020204" pitchFamily="34" charset="0"/>
+              <a:buNone/>
+              <a:tabLst/>
+              <a:defRPr/>
+            </a:pPr>
+            <a:endParaRPr kumimoji="0" lang="en-US" sz="1600" b="0" i="0" u="none" strike="noStrike" kern="1200" cap="none" spc="0" normalizeH="0" baseline="0" noProof="0" dirty="0">
+              <a:ln>
+                <a:noFill/>
+              </a:ln>
+              <a:solidFill>
+                <a:sysClr val="window" lastClr="FFFFFF"/>
+              </a:solidFill>
+              <a:effectLst/>
+              <a:uLnTx/>
+              <a:uFillTx/>
+              <a:latin typeface="Calibri" panose="020F0502020204030204"/>
+              <a:ea typeface="+mn-ea"/>
+              <a:cs typeface="+mn-cs"/>
+            </a:endParaRPr>
+          </a:p>
+        </p:txBody>
+      </p:sp>
+      <p:pic>
+        <p:nvPicPr>
+          <p:cNvPr id="21" name="Content Placeholder 6" descr="Screen Clipping"/>
+          <p:cNvPicPr>
+            <a:picLocks noChangeAspect="1"/>
+          </p:cNvPicPr>
+          <p:nvPr/>
+        </p:nvPicPr>
+        <p:blipFill rotWithShape="1">
+          <a:blip r:embed="rId4" cstate="print">
+            <a:extLst>
+              <a:ext uri="{28A0092B-C50C-407E-A947-70E740481C1C}">
+                <a14:useLocalDpi xmlns:a14="http://schemas.microsoft.com/office/drawing/2010/main" val="0"/>
+              </a:ext>
+            </a:extLst>
+          </a:blip>
+          <a:srcRect b="2703"/>
+          <a:stretch/>
+        </p:blipFill>
+        <p:spPr>
+          <a:xfrm>
+            <a:off x="4701092" y="1237514"/>
+            <a:ext cx="3381174" cy="3289791"/>
+          </a:xfrm>
+          <a:prstGeom prst="rect">
+            <a:avLst/>
+          </a:prstGeom>
+        </p:spPr>
+      </p:pic>
+      <p:sp>
+        <p:nvSpPr>
+          <p:cNvPr id="3" name="TextBox 2"/>
+          <p:cNvSpPr txBox="1"/>
+          <p:nvPr/>
+        </p:nvSpPr>
+        <p:spPr>
+          <a:xfrm>
+            <a:off x="914399" y="4854936"/>
+            <a:ext cx="7315200" cy="707886"/>
+          </a:xfrm>
+          <a:prstGeom prst="rect">
+            <a:avLst/>
+          </a:prstGeom>
+          <a:noFill/>
+        </p:spPr>
+        <p:txBody>
+          <a:bodyPr wrap="square" rtlCol="0">
+            <a:spAutoFit/>
+          </a:bodyPr>
+          <a:lstStyle/>
+          <a:p>
+            <a:r>
+              <a:rPr lang="en-US" sz="2000" dirty="0">
+                <a:solidFill>
+                  <a:schemeClr val="bg1"/>
+                </a:solidFill>
+              </a:rPr>
+              <a:t>In </a:t>
+            </a:r>
+            <a:r>
+              <a:rPr lang="en-US" sz="2000" i="1" dirty="0">
+                <a:solidFill>
+                  <a:schemeClr val="bg1"/>
+                </a:solidFill>
+              </a:rPr>
+              <a:t>directed networks,</a:t>
+            </a:r>
+            <a:r>
+              <a:rPr lang="en-US" sz="2000" dirty="0">
+                <a:solidFill>
+                  <a:schemeClr val="bg1"/>
+                </a:solidFill>
+              </a:rPr>
+              <a:t> like AOPs, components can be </a:t>
+            </a:r>
+            <a:r>
+              <a:rPr lang="en-US" sz="2000" i="1" dirty="0">
+                <a:solidFill>
+                  <a:schemeClr val="bg1"/>
+                </a:solidFill>
+              </a:rPr>
+              <a:t>weakly</a:t>
+            </a:r>
+            <a:r>
+              <a:rPr lang="en-US" sz="2000" dirty="0">
+                <a:solidFill>
+                  <a:schemeClr val="bg1"/>
+                </a:solidFill>
+              </a:rPr>
+              <a:t> or </a:t>
+            </a:r>
+            <a:r>
+              <a:rPr lang="en-US" sz="2000" i="1" dirty="0">
+                <a:solidFill>
+                  <a:schemeClr val="bg1"/>
+                </a:solidFill>
+              </a:rPr>
+              <a:t>strongly </a:t>
+            </a:r>
+            <a:r>
+              <a:rPr lang="en-US" sz="2000" dirty="0">
+                <a:solidFill>
+                  <a:schemeClr val="bg1"/>
+                </a:solidFill>
+              </a:rPr>
+              <a:t>connected. </a:t>
+            </a:r>
+            <a:endParaRPr lang="en-US" sz="2000" i="1" dirty="0">
+              <a:solidFill>
+                <a:schemeClr val="bg1"/>
+              </a:solidFill>
+            </a:endParaRPr>
+          </a:p>
+        </p:txBody>
+      </p:sp>
+    </p:spTree>
+    <p:extLst>
+      <p:ext uri="{BB962C8B-B14F-4D97-AF65-F5344CB8AC3E}">
+        <p14:creationId xmlns:p14="http://schemas.microsoft.com/office/powerpoint/2010/main" val="3878922642"/>
+      </p:ext>
+    </p:extLst>
+  </p:cSld>
+  <p:clrMapOvr>
+    <a:masterClrMapping/>
+  </p:clrMapOvr>
+</p:sld>
+</file>
+
+<file path=ppt/slides/slide9.xml><?xml version="1.0" encoding="utf-8"?>
+<p:sld xmlns:a="http://schemas.openxmlformats.org/drawingml/2006/main" xmlns:r="http://schemas.openxmlformats.org/officeDocument/2006/relationships" xmlns:p="http://schemas.openxmlformats.org/presentationml/2006/main">
+  <p:cSld>
+    <p:spTree>
+      <p:nvGrpSpPr>
+        <p:cNvPr id="1" name=""/>
+        <p:cNvGrpSpPr/>
+        <p:nvPr/>
+      </p:nvGrpSpPr>
+      <p:grpSpPr>
+        <a:xfrm>
+          <a:off x="0" y="0"/>
+          <a:ext cx="0" cy="0"/>
+          <a:chOff x="0" y="0"/>
+          <a:chExt cx="0" cy="0"/>
+        </a:xfrm>
+      </p:grpSpPr>
+      <p:sp>
+        <p:nvSpPr>
+          <p:cNvPr id="2" name="Title 1"/>
+          <p:cNvSpPr>
+            <a:spLocks noGrp="1"/>
+          </p:cNvSpPr>
+          <p:nvPr>
+            <p:ph type="title"/>
+          </p:nvPr>
+        </p:nvSpPr>
+        <p:spPr/>
+        <p:txBody>
+          <a:bodyPr/>
+          <a:lstStyle/>
+          <a:p>
+            <a:endParaRPr lang="en-US"/>
+          </a:p>
+        </p:txBody>
+      </p:sp>
+      <p:sp>
+        <p:nvSpPr>
+          <p:cNvPr id="3" name="Content Placeholder 2"/>
+          <p:cNvSpPr>
+            <a:spLocks noGrp="1"/>
+          </p:cNvSpPr>
+          <p:nvPr>
+            <p:ph idx="1"/>
+          </p:nvPr>
+        </p:nvSpPr>
+        <p:spPr/>
+        <p:txBody>
+          <a:bodyPr/>
+          <a:lstStyle/>
+          <a:p>
+            <a:endParaRPr lang="en-US"/>
+          </a:p>
+        </p:txBody>
+      </p:sp>
+      <p:sp>
+        <p:nvSpPr>
+          <p:cNvPr id="4" name="Slide Number Placeholder 3"/>
+          <p:cNvSpPr>
+            <a:spLocks noGrp="1"/>
+          </p:cNvSpPr>
+          <p:nvPr>
+            <p:ph type="sldNum" sz="quarter" idx="12"/>
+          </p:nvPr>
+        </p:nvSpPr>
+        <p:spPr/>
+        <p:txBody>
+          <a:bodyPr/>
+          <a:lstStyle/>
+          <a:p>
+            <a:pPr>
+              <a:defRPr/>
+            </a:pPr>
+            <a:fld id="{BEF2A795-0D1C-4340-A163-773CC4D3E4EC}" type="slidenum">
+              <a:rPr lang="en-US" smtClean="0"/>
+              <a:pPr>
+                <a:defRPr/>
+              </a:pPr>
+              <a:t>8</a:t>
+            </a:fld>
+            <a:endParaRPr lang="en-US" dirty="0"/>
+          </a:p>
+        </p:txBody>
+      </p:sp>
+    </p:spTree>
+    <p:extLst>
+      <p:ext uri="{BB962C8B-B14F-4D97-AF65-F5344CB8AC3E}">
+        <p14:creationId xmlns:p14="http://schemas.microsoft.com/office/powerpoint/2010/main" val="1633456427"/>
       </p:ext>
     </p:extLst>
   </p:cSld>

</xml_diff>